<commit_message>
updates to testing presentation
</commit_message>
<xml_diff>
--- a/presentations/Testing Intro.pptx
+++ b/presentations/Testing Intro.pptx
@@ -6,31 +6,33 @@
     <p:sldMasterId id="2147484642" r:id="rId5"/>
   </p:sldMasterIdLst>
   <p:notesMasterIdLst>
-    <p:notesMasterId r:id="rId25"/>
+    <p:notesMasterId r:id="rId27"/>
   </p:notesMasterIdLst>
   <p:handoutMasterIdLst>
-    <p:handoutMasterId r:id="rId26"/>
+    <p:handoutMasterId r:id="rId28"/>
   </p:handoutMasterIdLst>
   <p:sldIdLst>
     <p:sldId id="1856" r:id="rId6"/>
     <p:sldId id="1857" r:id="rId7"/>
     <p:sldId id="1858" r:id="rId8"/>
     <p:sldId id="1872" r:id="rId9"/>
-    <p:sldId id="1859" r:id="rId10"/>
-    <p:sldId id="1861" r:id="rId11"/>
-    <p:sldId id="1860" r:id="rId12"/>
-    <p:sldId id="1862" r:id="rId13"/>
-    <p:sldId id="1867" r:id="rId14"/>
-    <p:sldId id="1871" r:id="rId15"/>
-    <p:sldId id="1863" r:id="rId16"/>
-    <p:sldId id="1864" r:id="rId17"/>
-    <p:sldId id="1866" r:id="rId18"/>
-    <p:sldId id="1865" r:id="rId19"/>
-    <p:sldId id="1868" r:id="rId20"/>
-    <p:sldId id="1869" r:id="rId21"/>
-    <p:sldId id="1870" r:id="rId22"/>
-    <p:sldId id="1873" r:id="rId23"/>
-    <p:sldId id="1532" r:id="rId24"/>
+    <p:sldId id="1874" r:id="rId10"/>
+    <p:sldId id="1859" r:id="rId11"/>
+    <p:sldId id="1861" r:id="rId12"/>
+    <p:sldId id="1875" r:id="rId13"/>
+    <p:sldId id="1860" r:id="rId14"/>
+    <p:sldId id="1862" r:id="rId15"/>
+    <p:sldId id="1867" r:id="rId16"/>
+    <p:sldId id="1871" r:id="rId17"/>
+    <p:sldId id="1863" r:id="rId18"/>
+    <p:sldId id="1864" r:id="rId19"/>
+    <p:sldId id="1866" r:id="rId20"/>
+    <p:sldId id="1865" r:id="rId21"/>
+    <p:sldId id="1868" r:id="rId22"/>
+    <p:sldId id="1869" r:id="rId23"/>
+    <p:sldId id="1870" r:id="rId24"/>
+    <p:sldId id="1873" r:id="rId25"/>
+    <p:sldId id="1532" r:id="rId26"/>
   </p:sldIdLst>
   <p:sldSz cx="12192000" cy="6858000"/>
   <p:notesSz cx="6858000" cy="9144000"/>
@@ -146,12 +148,14 @@
           <p14:sldIdLst>
             <p14:sldId id="1858"/>
             <p14:sldId id="1872"/>
+            <p14:sldId id="1874"/>
           </p14:sldIdLst>
         </p14:section>
         <p14:section name="About Testing" id="{34502C33-422C-4664-8BAE-1D932FAC80A2}">
           <p14:sldIdLst>
             <p14:sldId id="1859"/>
             <p14:sldId id="1861"/>
+            <p14:sldId id="1875"/>
             <p14:sldId id="1860"/>
           </p14:sldIdLst>
         </p14:section>
@@ -305,7 +309,7 @@
               <a:rPr lang="en-US" smtClean="0">
                 <a:latin typeface="Segoe UI" pitchFamily="34" charset="0"/>
               </a:rPr>
-              <a:t>2/2/2022 11:59 AM</a:t>
+              <a:t>2/2/2022 3:21 PM</a:t>
             </a:fld>
             <a:endParaRPr lang="en-US" dirty="0">
               <a:latin typeface="Segoe UI" pitchFamily="34" charset="0"/>
@@ -583,7 +587,7 @@
           <a:p>
             <a:fld id="{386CE63F-9E7F-4C04-9D0D-FCA25A8E9E86}" type="datetime8">
               <a:rPr lang="en-US" smtClean="0"/>
-              <a:t>2/2/2022 11:59 AM</a:t>
+              <a:t>2/2/2022 3:03 PM</a:t>
             </a:fld>
             <a:endParaRPr lang="en-US" dirty="0"/>
           </a:p>
@@ -950,7 +954,7 @@
           <a:p>
             <a:fld id="{321E5A7B-BB8D-4368-A182-109669521632}" type="datetime8">
               <a:rPr lang="en-US" smtClean="0"/>
-              <a:t>2/2/2022 11:59 AM</a:t>
+              <a:t>2/2/2022 3:03 PM</a:t>
             </a:fld>
             <a:endParaRPr lang="en-US" dirty="0"/>
           </a:p>
@@ -1100,7 +1104,7 @@
                   <a:prstClr val="black"/>
                 </a:solidFill>
               </a:rPr>
-              <a:t>2/2/2022 11:59 AM</a:t>
+              <a:t>2/2/2022 3:03 PM</a:t>
             </a:fld>
             <a:endParaRPr lang="en-US" dirty="0">
               <a:solidFill>
@@ -1132,7 +1136,7 @@
                 </a:solidFill>
               </a:rPr>
               <a:pPr/>
-              <a:t>19</a:t>
+              <a:t>21</a:t>
             </a:fld>
             <a:endParaRPr lang="en-US" dirty="0">
               <a:solidFill>
@@ -15292,6 +15296,1636 @@
           <p:cNvPr id="2" name="Title 1">
             <a:extLst>
               <a:ext uri="{FF2B5EF4-FFF2-40B4-BE49-F238E27FC236}">
+                <a16:creationId xmlns:a16="http://schemas.microsoft.com/office/drawing/2014/main" id="{696165C6-27A1-4C49-9F4A-23D983A0E458}"/>
+              </a:ext>
+            </a:extLst>
+          </p:cNvPr>
+          <p:cNvSpPr>
+            <a:spLocks noGrp="1"/>
+          </p:cNvSpPr>
+          <p:nvPr>
+            <p:ph type="title"/>
+          </p:nvPr>
+        </p:nvSpPr>
+        <p:spPr/>
+        <p:txBody>
+          <a:bodyPr/>
+          <a:lstStyle/>
+          <a:p>
+            <a:r>
+              <a:rPr lang="en-GB" dirty="0"/>
+              <a:t>Test Areas</a:t>
+            </a:r>
+          </a:p>
+        </p:txBody>
+      </p:sp>
+      <p:sp>
+        <p:nvSpPr>
+          <p:cNvPr id="3" name="Text Placeholder 2">
+            <a:extLst>
+              <a:ext uri="{FF2B5EF4-FFF2-40B4-BE49-F238E27FC236}">
+                <a16:creationId xmlns:a16="http://schemas.microsoft.com/office/drawing/2014/main" id="{00623A20-4A63-4676-B8AB-C147AA39A383}"/>
+              </a:ext>
+            </a:extLst>
+          </p:cNvPr>
+          <p:cNvSpPr>
+            <a:spLocks noGrp="1"/>
+          </p:cNvSpPr>
+          <p:nvPr>
+            <p:ph type="body" sz="quarter" idx="10"/>
+          </p:nvPr>
+        </p:nvSpPr>
+        <p:spPr>
+          <a:xfrm>
+            <a:off x="584200" y="1435497"/>
+            <a:ext cx="11018520" cy="2499146"/>
+          </a:xfrm>
+        </p:spPr>
+        <p:txBody>
+          <a:bodyPr/>
+          <a:lstStyle/>
+          <a:p>
+            <a:r>
+              <a:rPr lang="en-GB" dirty="0"/>
+              <a:t>Dates</a:t>
+            </a:r>
+          </a:p>
+          <a:p>
+            <a:r>
+              <a:rPr lang="en-GB" dirty="0"/>
+              <a:t>Data Types</a:t>
+            </a:r>
+          </a:p>
+          <a:p>
+            <a:r>
+              <a:rPr lang="en-GB" dirty="0"/>
+              <a:t>Schema</a:t>
+            </a:r>
+          </a:p>
+          <a:p>
+            <a:r>
+              <a:rPr lang="en-GB" dirty="0"/>
+              <a:t>Infrastructure deployment success</a:t>
+            </a:r>
+          </a:p>
+          <a:p>
+            <a:r>
+              <a:rPr lang="en-GB" dirty="0"/>
+              <a:t>Pipeline speed/capacity</a:t>
+            </a:r>
+          </a:p>
+        </p:txBody>
+      </p:sp>
+    </p:spTree>
+    <p:extLst>
+      <p:ext uri="{BB962C8B-B14F-4D97-AF65-F5344CB8AC3E}">
+        <p14:creationId xmlns:p14="http://schemas.microsoft.com/office/powerpoint/2010/main" val="3735633958"/>
+      </p:ext>
+    </p:extLst>
+  </p:cSld>
+  <p:clrMapOvr>
+    <a:masterClrMapping/>
+  </p:clrMapOvr>
+  <p:transition>
+    <p:fade/>
+  </p:transition>
+</p:sld>
+</file>
+
+<file path=ppt/slides/slide11.xml><?xml version="1.0" encoding="utf-8"?>
+<p:sld xmlns:a="http://schemas.openxmlformats.org/drawingml/2006/main" xmlns:r="http://schemas.openxmlformats.org/officeDocument/2006/relationships" xmlns:p="http://schemas.openxmlformats.org/presentationml/2006/main">
+  <p:cSld>
+    <p:spTree>
+      <p:nvGrpSpPr>
+        <p:cNvPr id="1" name=""/>
+        <p:cNvGrpSpPr/>
+        <p:nvPr/>
+      </p:nvGrpSpPr>
+      <p:grpSpPr>
+        <a:xfrm>
+          <a:off x="0" y="0"/>
+          <a:ext cx="0" cy="0"/>
+          <a:chOff x="0" y="0"/>
+          <a:chExt cx="0" cy="0"/>
+        </a:xfrm>
+      </p:grpSpPr>
+      <p:sp>
+        <p:nvSpPr>
+          <p:cNvPr id="2" name="Title 1">
+            <a:extLst>
+              <a:ext uri="{FF2B5EF4-FFF2-40B4-BE49-F238E27FC236}">
+                <a16:creationId xmlns:a16="http://schemas.microsoft.com/office/drawing/2014/main" id="{A406683A-959A-44D3-A53F-E45ECE353DE5}"/>
+              </a:ext>
+            </a:extLst>
+          </p:cNvPr>
+          <p:cNvSpPr>
+            <a:spLocks noGrp="1"/>
+          </p:cNvSpPr>
+          <p:nvPr>
+            <p:ph type="title"/>
+          </p:nvPr>
+        </p:nvSpPr>
+        <p:spPr/>
+        <p:txBody>
+          <a:bodyPr/>
+          <a:lstStyle/>
+          <a:p>
+            <a:r>
+              <a:rPr lang="en-GB" dirty="0"/>
+              <a:t>Data Tests - Aggregations</a:t>
+            </a:r>
+          </a:p>
+        </p:txBody>
+      </p:sp>
+      <p:sp>
+        <p:nvSpPr>
+          <p:cNvPr id="3" name="Text Placeholder 2">
+            <a:extLst>
+              <a:ext uri="{FF2B5EF4-FFF2-40B4-BE49-F238E27FC236}">
+                <a16:creationId xmlns:a16="http://schemas.microsoft.com/office/drawing/2014/main" id="{B01FF65B-238B-4EEB-9AFB-BD729623867F}"/>
+              </a:ext>
+            </a:extLst>
+          </p:cNvPr>
+          <p:cNvSpPr>
+            <a:spLocks noGrp="1"/>
+          </p:cNvSpPr>
+          <p:nvPr>
+            <p:ph type="body" sz="quarter" idx="10"/>
+          </p:nvPr>
+        </p:nvSpPr>
+        <p:spPr>
+          <a:xfrm>
+            <a:off x="584200" y="1435497"/>
+            <a:ext cx="11018520" cy="2055947"/>
+          </a:xfrm>
+        </p:spPr>
+        <p:txBody>
+          <a:bodyPr/>
+          <a:lstStyle/>
+          <a:p>
+            <a:r>
+              <a:rPr lang="en-GB" dirty="0"/>
+              <a:t>Test your aggregations</a:t>
+            </a:r>
+          </a:p>
+          <a:p>
+            <a:pPr lvl="1"/>
+            <a:r>
+              <a:rPr lang="en-GB" dirty="0"/>
+              <a:t>Known good data</a:t>
+            </a:r>
+          </a:p>
+          <a:p>
+            <a:pPr lvl="1"/>
+            <a:r>
+              <a:rPr lang="en-GB" dirty="0"/>
+              <a:t>Known bad data</a:t>
+            </a:r>
+          </a:p>
+          <a:p>
+            <a:pPr lvl="1"/>
+            <a:r>
+              <a:rPr lang="en-GB" dirty="0"/>
+              <a:t>Known time ranges</a:t>
+            </a:r>
+          </a:p>
+          <a:p>
+            <a:r>
+              <a:rPr lang="en-GB" dirty="0"/>
+              <a:t>Below, the expected value for total sales is 65</a:t>
+            </a:r>
+          </a:p>
+        </p:txBody>
+      </p:sp>
+      <p:graphicFrame>
+        <p:nvGraphicFramePr>
+          <p:cNvPr id="4" name="Table 4">
+            <a:extLst>
+              <a:ext uri="{FF2B5EF4-FFF2-40B4-BE49-F238E27FC236}">
+                <a16:creationId xmlns:a16="http://schemas.microsoft.com/office/drawing/2014/main" id="{9E5919AD-46AE-4125-9A7E-7A14B35615F3}"/>
+              </a:ext>
+            </a:extLst>
+          </p:cNvPr>
+          <p:cNvGraphicFramePr>
+            <a:graphicFrameLocks noGrp="1"/>
+          </p:cNvGraphicFramePr>
+          <p:nvPr>
+            <p:extLst>
+              <p:ext uri="{D42A27DB-BD31-4B8C-83A1-F6EECF244321}">
+                <p14:modId xmlns:p14="http://schemas.microsoft.com/office/powerpoint/2010/main" val="1069046613"/>
+              </p:ext>
+            </p:extLst>
+          </p:nvPr>
+        </p:nvGraphicFramePr>
+        <p:xfrm>
+          <a:off x="698500" y="3674533"/>
+          <a:ext cx="10904220" cy="2966720"/>
+        </p:xfrm>
+        <a:graphic>
+          <a:graphicData uri="http://schemas.openxmlformats.org/drawingml/2006/table">
+            <a:tbl>
+              <a:tblPr firstRow="1" bandRow="1">
+                <a:tableStyleId>{5C22544A-7EE6-4342-B048-85BDC9FD1C3A}</a:tableStyleId>
+              </a:tblPr>
+              <a:tblGrid>
+                <a:gridCol w="1397000">
+                  <a:extLst>
+                    <a:ext uri="{9D8B030D-6E8A-4147-A177-3AD203B41FA5}">
+                      <a16:colId xmlns:a16="http://schemas.microsoft.com/office/drawing/2014/main" val="3870008085"/>
+                    </a:ext>
+                  </a:extLst>
+                </a:gridCol>
+                <a:gridCol w="1722967">
+                  <a:extLst>
+                    <a:ext uri="{9D8B030D-6E8A-4147-A177-3AD203B41FA5}">
+                      <a16:colId xmlns:a16="http://schemas.microsoft.com/office/drawing/2014/main" val="1156849591"/>
+                    </a:ext>
+                  </a:extLst>
+                </a:gridCol>
+                <a:gridCol w="2053166">
+                  <a:extLst>
+                    <a:ext uri="{9D8B030D-6E8A-4147-A177-3AD203B41FA5}">
+                      <a16:colId xmlns:a16="http://schemas.microsoft.com/office/drawing/2014/main" val="3313587052"/>
+                    </a:ext>
+                  </a:extLst>
+                </a:gridCol>
+                <a:gridCol w="2383367">
+                  <a:extLst>
+                    <a:ext uri="{9D8B030D-6E8A-4147-A177-3AD203B41FA5}">
+                      <a16:colId xmlns:a16="http://schemas.microsoft.com/office/drawing/2014/main" val="3408029281"/>
+                    </a:ext>
+                  </a:extLst>
+                </a:gridCol>
+                <a:gridCol w="3347720">
+                  <a:extLst>
+                    <a:ext uri="{9D8B030D-6E8A-4147-A177-3AD203B41FA5}">
+                      <a16:colId xmlns:a16="http://schemas.microsoft.com/office/drawing/2014/main" val="3476761653"/>
+                    </a:ext>
+                  </a:extLst>
+                </a:gridCol>
+              </a:tblGrid>
+              <a:tr h="370840">
+                <a:tc>
+                  <a:txBody>
+                    <a:bodyPr/>
+                    <a:lstStyle/>
+                    <a:p>
+                      <a:pPr algn="ctr"/>
+                      <a:r>
+                        <a:rPr lang="en-GB" dirty="0"/>
+                        <a:t>Date</a:t>
+                      </a:r>
+                    </a:p>
+                  </a:txBody>
+                  <a:tcPr/>
+                </a:tc>
+                <a:tc>
+                  <a:txBody>
+                    <a:bodyPr/>
+                    <a:lstStyle/>
+                    <a:p>
+                      <a:pPr algn="ctr"/>
+                      <a:r>
+                        <a:rPr lang="en-GB" dirty="0"/>
+                        <a:t>Time</a:t>
+                      </a:r>
+                    </a:p>
+                  </a:txBody>
+                  <a:tcPr/>
+                </a:tc>
+                <a:tc>
+                  <a:txBody>
+                    <a:bodyPr/>
+                    <a:lstStyle/>
+                    <a:p>
+                      <a:pPr algn="ctr"/>
+                      <a:r>
+                        <a:rPr lang="en-GB" dirty="0"/>
+                        <a:t>Quantity</a:t>
+                      </a:r>
+                    </a:p>
+                  </a:txBody>
+                  <a:tcPr/>
+                </a:tc>
+                <a:tc>
+                  <a:txBody>
+                    <a:bodyPr/>
+                    <a:lstStyle/>
+                    <a:p>
+                      <a:pPr algn="ctr"/>
+                      <a:r>
+                        <a:rPr lang="en-GB" dirty="0"/>
+                        <a:t>Valid?</a:t>
+                      </a:r>
+                    </a:p>
+                  </a:txBody>
+                  <a:tcPr/>
+                </a:tc>
+                <a:tc>
+                  <a:txBody>
+                    <a:bodyPr/>
+                    <a:lstStyle/>
+                    <a:p>
+                      <a:pPr algn="ctr"/>
+                      <a:r>
+                        <a:rPr lang="en-GB" dirty="0"/>
+                        <a:t>Included in daily Aggregate?</a:t>
+                      </a:r>
+                    </a:p>
+                  </a:txBody>
+                  <a:tcPr/>
+                </a:tc>
+                <a:extLst>
+                  <a:ext uri="{0D108BD9-81ED-4DB2-BD59-A6C34878D82A}">
+                    <a16:rowId xmlns:a16="http://schemas.microsoft.com/office/drawing/2014/main" val="2650429286"/>
+                  </a:ext>
+                </a:extLst>
+              </a:tr>
+              <a:tr h="370840">
+                <a:tc>
+                  <a:txBody>
+                    <a:bodyPr/>
+                    <a:lstStyle/>
+                    <a:p>
+                      <a:pPr algn="ctr"/>
+                      <a:r>
+                        <a:rPr lang="en-GB" dirty="0"/>
+                        <a:t>26/03/2022</a:t>
+                      </a:r>
+                    </a:p>
+                  </a:txBody>
+                  <a:tcPr/>
+                </a:tc>
+                <a:tc>
+                  <a:txBody>
+                    <a:bodyPr/>
+                    <a:lstStyle/>
+                    <a:p>
+                      <a:pPr algn="ctr"/>
+                      <a:r>
+                        <a:rPr lang="en-GB" dirty="0"/>
+                        <a:t>23:59</a:t>
+                      </a:r>
+                    </a:p>
+                  </a:txBody>
+                  <a:tcPr/>
+                </a:tc>
+                <a:tc>
+                  <a:txBody>
+                    <a:bodyPr/>
+                    <a:lstStyle/>
+                    <a:p>
+                      <a:pPr algn="ctr"/>
+                      <a:r>
+                        <a:rPr lang="en-GB" dirty="0"/>
+                        <a:t>1</a:t>
+                      </a:r>
+                    </a:p>
+                  </a:txBody>
+                  <a:tcPr/>
+                </a:tc>
+                <a:tc>
+                  <a:txBody>
+                    <a:bodyPr/>
+                    <a:lstStyle/>
+                    <a:p>
+                      <a:pPr algn="ctr"/>
+                      <a:r>
+                        <a:rPr lang="en-GB" dirty="0"/>
+                        <a:t>Yes</a:t>
+                      </a:r>
+                    </a:p>
+                  </a:txBody>
+                  <a:tcPr>
+                    <a:solidFill>
+                      <a:schemeClr val="accent3">
+                        <a:lumMod val="40000"/>
+                        <a:lumOff val="60000"/>
+                      </a:schemeClr>
+                    </a:solidFill>
+                  </a:tcPr>
+                </a:tc>
+                <a:tc>
+                  <a:txBody>
+                    <a:bodyPr/>
+                    <a:lstStyle/>
+                    <a:p>
+                      <a:pPr algn="ctr"/>
+                      <a:r>
+                        <a:rPr lang="en-GB" dirty="0"/>
+                        <a:t>No</a:t>
+                      </a:r>
+                    </a:p>
+                  </a:txBody>
+                  <a:tcPr>
+                    <a:solidFill>
+                      <a:schemeClr val="accent4">
+                        <a:lumMod val="40000"/>
+                        <a:lumOff val="60000"/>
+                      </a:schemeClr>
+                    </a:solidFill>
+                  </a:tcPr>
+                </a:tc>
+                <a:extLst>
+                  <a:ext uri="{0D108BD9-81ED-4DB2-BD59-A6C34878D82A}">
+                    <a16:rowId xmlns:a16="http://schemas.microsoft.com/office/drawing/2014/main" val="615849865"/>
+                  </a:ext>
+                </a:extLst>
+              </a:tr>
+              <a:tr h="370840">
+                <a:tc>
+                  <a:txBody>
+                    <a:bodyPr/>
+                    <a:lstStyle/>
+                    <a:p>
+                      <a:pPr marL="0" marR="0" lvl="0" indent="0" algn="ctr" defTabSz="932742" rtl="0" eaLnBrk="1" fontAlgn="auto" latinLnBrk="0" hangingPunct="1">
+                        <a:lnSpc>
+                          <a:spcPct val="100000"/>
+                        </a:lnSpc>
+                        <a:spcBef>
+                          <a:spcPts val="0"/>
+                        </a:spcBef>
+                        <a:spcAft>
+                          <a:spcPts val="0"/>
+                        </a:spcAft>
+                        <a:buClrTx/>
+                        <a:buSzTx/>
+                        <a:buFontTx/>
+                        <a:buNone/>
+                        <a:tabLst/>
+                        <a:defRPr/>
+                      </a:pPr>
+                      <a:r>
+                        <a:rPr lang="en-GB" dirty="0"/>
+                        <a:t>27/03/2022</a:t>
+                      </a:r>
+                    </a:p>
+                  </a:txBody>
+                  <a:tcPr/>
+                </a:tc>
+                <a:tc>
+                  <a:txBody>
+                    <a:bodyPr/>
+                    <a:lstStyle/>
+                    <a:p>
+                      <a:pPr algn="ctr"/>
+                      <a:r>
+                        <a:rPr lang="en-GB" dirty="0"/>
+                        <a:t>00:00</a:t>
+                      </a:r>
+                    </a:p>
+                  </a:txBody>
+                  <a:tcPr/>
+                </a:tc>
+                <a:tc>
+                  <a:txBody>
+                    <a:bodyPr/>
+                    <a:lstStyle/>
+                    <a:p>
+                      <a:pPr algn="ctr"/>
+                      <a:r>
+                        <a:rPr lang="en-GB" dirty="0"/>
+                        <a:t>2</a:t>
+                      </a:r>
+                    </a:p>
+                  </a:txBody>
+                  <a:tcPr/>
+                </a:tc>
+                <a:tc>
+                  <a:txBody>
+                    <a:bodyPr/>
+                    <a:lstStyle/>
+                    <a:p>
+                      <a:pPr algn="ctr"/>
+                      <a:r>
+                        <a:rPr lang="en-GB" dirty="0"/>
+                        <a:t>Yes</a:t>
+                      </a:r>
+                    </a:p>
+                  </a:txBody>
+                  <a:tcPr>
+                    <a:solidFill>
+                      <a:schemeClr val="accent3">
+                        <a:lumMod val="40000"/>
+                        <a:lumOff val="60000"/>
+                      </a:schemeClr>
+                    </a:solidFill>
+                  </a:tcPr>
+                </a:tc>
+                <a:tc>
+                  <a:txBody>
+                    <a:bodyPr/>
+                    <a:lstStyle/>
+                    <a:p>
+                      <a:pPr marL="0" marR="0" lvl="0" indent="0" algn="ctr" defTabSz="932742" rtl="0" eaLnBrk="1" fontAlgn="auto" latinLnBrk="0" hangingPunct="1">
+                        <a:lnSpc>
+                          <a:spcPct val="100000"/>
+                        </a:lnSpc>
+                        <a:spcBef>
+                          <a:spcPts val="0"/>
+                        </a:spcBef>
+                        <a:spcAft>
+                          <a:spcPts val="0"/>
+                        </a:spcAft>
+                        <a:buClrTx/>
+                        <a:buSzTx/>
+                        <a:buFontTx/>
+                        <a:buNone/>
+                        <a:tabLst/>
+                        <a:defRPr/>
+                      </a:pPr>
+                      <a:r>
+                        <a:rPr kumimoji="0" lang="en-GB" sz="1800" b="0" i="0" u="none" strike="noStrike" kern="1200" cap="none" spc="0" normalizeH="0" baseline="0" noProof="0">
+                          <a:ln>
+                            <a:noFill/>
+                          </a:ln>
+                          <a:solidFill>
+                            <a:srgbClr val="1A1A1A"/>
+                          </a:solidFill>
+                          <a:effectLst/>
+                          <a:uLnTx/>
+                          <a:uFillTx/>
+                          <a:latin typeface="Segoe UI"/>
+                          <a:ea typeface="+mn-ea"/>
+                          <a:cs typeface="+mn-cs"/>
+                        </a:rPr>
+                        <a:t>Yes</a:t>
+                      </a:r>
+                      <a:endParaRPr kumimoji="0" lang="en-GB" sz="1800" b="0" i="0" u="none" strike="noStrike" kern="1200" cap="none" spc="0" normalizeH="0" baseline="0" noProof="0" dirty="0">
+                        <a:ln>
+                          <a:noFill/>
+                        </a:ln>
+                        <a:solidFill>
+                          <a:srgbClr val="1A1A1A"/>
+                        </a:solidFill>
+                        <a:effectLst/>
+                        <a:uLnTx/>
+                        <a:uFillTx/>
+                        <a:latin typeface="Segoe UI"/>
+                        <a:ea typeface="+mn-ea"/>
+                        <a:cs typeface="+mn-cs"/>
+                      </a:endParaRPr>
+                    </a:p>
+                  </a:txBody>
+                  <a:tcPr>
+                    <a:solidFill>
+                      <a:schemeClr val="accent3">
+                        <a:lumMod val="40000"/>
+                        <a:lumOff val="60000"/>
+                      </a:schemeClr>
+                    </a:solidFill>
+                  </a:tcPr>
+                </a:tc>
+                <a:extLst>
+                  <a:ext uri="{0D108BD9-81ED-4DB2-BD59-A6C34878D82A}">
+                    <a16:rowId xmlns:a16="http://schemas.microsoft.com/office/drawing/2014/main" val="4149233034"/>
+                  </a:ext>
+                </a:extLst>
+              </a:tr>
+              <a:tr h="370840">
+                <a:tc>
+                  <a:txBody>
+                    <a:bodyPr/>
+                    <a:lstStyle/>
+                    <a:p>
+                      <a:pPr marL="0" marR="0" lvl="0" indent="0" algn="ctr" defTabSz="932742" rtl="0" eaLnBrk="1" fontAlgn="auto" latinLnBrk="0" hangingPunct="1">
+                        <a:lnSpc>
+                          <a:spcPct val="100000"/>
+                        </a:lnSpc>
+                        <a:spcBef>
+                          <a:spcPts val="0"/>
+                        </a:spcBef>
+                        <a:spcAft>
+                          <a:spcPts val="0"/>
+                        </a:spcAft>
+                        <a:buClrTx/>
+                        <a:buSzTx/>
+                        <a:buFontTx/>
+                        <a:buNone/>
+                        <a:tabLst/>
+                        <a:defRPr/>
+                      </a:pPr>
+                      <a:r>
+                        <a:rPr kumimoji="0" lang="en-GB" sz="1800" b="0" i="0" u="none" strike="noStrike" kern="1200" cap="none" spc="0" normalizeH="0" baseline="0" noProof="0">
+                          <a:ln>
+                            <a:noFill/>
+                          </a:ln>
+                          <a:solidFill>
+                            <a:srgbClr val="1A1A1A"/>
+                          </a:solidFill>
+                          <a:effectLst/>
+                          <a:uLnTx/>
+                          <a:uFillTx/>
+                          <a:latin typeface="Segoe UI"/>
+                          <a:ea typeface="+mn-ea"/>
+                          <a:cs typeface="+mn-cs"/>
+                        </a:rPr>
+                        <a:t>27/03/2022</a:t>
+                      </a:r>
+                      <a:endParaRPr kumimoji="0" lang="en-GB" sz="1800" b="0" i="0" u="none" strike="noStrike" kern="1200" cap="none" spc="0" normalizeH="0" baseline="0" noProof="0" dirty="0">
+                        <a:ln>
+                          <a:noFill/>
+                        </a:ln>
+                        <a:solidFill>
+                          <a:srgbClr val="1A1A1A"/>
+                        </a:solidFill>
+                        <a:effectLst/>
+                        <a:uLnTx/>
+                        <a:uFillTx/>
+                        <a:latin typeface="Segoe UI"/>
+                        <a:ea typeface="+mn-ea"/>
+                        <a:cs typeface="+mn-cs"/>
+                      </a:endParaRPr>
+                    </a:p>
+                  </a:txBody>
+                  <a:tcPr/>
+                </a:tc>
+                <a:tc>
+                  <a:txBody>
+                    <a:bodyPr/>
+                    <a:lstStyle/>
+                    <a:p>
+                      <a:pPr algn="ctr"/>
+                      <a:r>
+                        <a:rPr lang="en-GB" dirty="0"/>
+                        <a:t>00:01</a:t>
+                      </a:r>
+                    </a:p>
+                  </a:txBody>
+                  <a:tcPr/>
+                </a:tc>
+                <a:tc>
+                  <a:txBody>
+                    <a:bodyPr/>
+                    <a:lstStyle/>
+                    <a:p>
+                      <a:pPr algn="ctr"/>
+                      <a:r>
+                        <a:rPr lang="en-GB" dirty="0"/>
+                        <a:t>6</a:t>
+                      </a:r>
+                    </a:p>
+                  </a:txBody>
+                  <a:tcPr/>
+                </a:tc>
+                <a:tc>
+                  <a:txBody>
+                    <a:bodyPr/>
+                    <a:lstStyle/>
+                    <a:p>
+                      <a:pPr marL="0" marR="0" lvl="0" indent="0" algn="ctr" defTabSz="932742" rtl="0" eaLnBrk="1" fontAlgn="auto" latinLnBrk="0" hangingPunct="1">
+                        <a:lnSpc>
+                          <a:spcPct val="100000"/>
+                        </a:lnSpc>
+                        <a:spcBef>
+                          <a:spcPts val="0"/>
+                        </a:spcBef>
+                        <a:spcAft>
+                          <a:spcPts val="0"/>
+                        </a:spcAft>
+                        <a:buClrTx/>
+                        <a:buSzTx/>
+                        <a:buFontTx/>
+                        <a:buNone/>
+                        <a:tabLst/>
+                        <a:defRPr/>
+                      </a:pPr>
+                      <a:r>
+                        <a:rPr kumimoji="0" lang="en-GB" sz="1800" b="0" i="0" u="none" strike="noStrike" kern="1200" cap="none" spc="0" normalizeH="0" baseline="0" noProof="0" dirty="0">
+                          <a:ln>
+                            <a:noFill/>
+                          </a:ln>
+                          <a:solidFill>
+                            <a:srgbClr val="1A1A1A"/>
+                          </a:solidFill>
+                          <a:effectLst/>
+                          <a:uLnTx/>
+                          <a:uFillTx/>
+                          <a:latin typeface="Segoe UI"/>
+                          <a:ea typeface="+mn-ea"/>
+                          <a:cs typeface="+mn-cs"/>
+                        </a:rPr>
+                        <a:t>Yes</a:t>
+                      </a:r>
+                    </a:p>
+                  </a:txBody>
+                  <a:tcPr>
+                    <a:solidFill>
+                      <a:schemeClr val="accent3">
+                        <a:lumMod val="40000"/>
+                        <a:lumOff val="60000"/>
+                      </a:schemeClr>
+                    </a:solidFill>
+                  </a:tcPr>
+                </a:tc>
+                <a:tc>
+                  <a:txBody>
+                    <a:bodyPr/>
+                    <a:lstStyle/>
+                    <a:p>
+                      <a:pPr marL="0" marR="0" lvl="0" indent="0" algn="ctr" defTabSz="932742" rtl="0" eaLnBrk="1" fontAlgn="auto" latinLnBrk="0" hangingPunct="1">
+                        <a:lnSpc>
+                          <a:spcPct val="100000"/>
+                        </a:lnSpc>
+                        <a:spcBef>
+                          <a:spcPts val="0"/>
+                        </a:spcBef>
+                        <a:spcAft>
+                          <a:spcPts val="0"/>
+                        </a:spcAft>
+                        <a:buClrTx/>
+                        <a:buSzTx/>
+                        <a:buFontTx/>
+                        <a:buNone/>
+                        <a:tabLst/>
+                        <a:defRPr/>
+                      </a:pPr>
+                      <a:r>
+                        <a:rPr kumimoji="0" lang="en-GB" sz="1800" b="0" i="0" u="none" strike="noStrike" kern="1200" cap="none" spc="0" normalizeH="0" baseline="0" noProof="0">
+                          <a:ln>
+                            <a:noFill/>
+                          </a:ln>
+                          <a:solidFill>
+                            <a:srgbClr val="1A1A1A"/>
+                          </a:solidFill>
+                          <a:effectLst/>
+                          <a:uLnTx/>
+                          <a:uFillTx/>
+                          <a:latin typeface="Segoe UI"/>
+                          <a:ea typeface="+mn-ea"/>
+                          <a:cs typeface="+mn-cs"/>
+                        </a:rPr>
+                        <a:t>Yes</a:t>
+                      </a:r>
+                      <a:endParaRPr kumimoji="0" lang="en-GB" sz="1800" b="0" i="0" u="none" strike="noStrike" kern="1200" cap="none" spc="0" normalizeH="0" baseline="0" noProof="0" dirty="0">
+                        <a:ln>
+                          <a:noFill/>
+                        </a:ln>
+                        <a:solidFill>
+                          <a:srgbClr val="1A1A1A"/>
+                        </a:solidFill>
+                        <a:effectLst/>
+                        <a:uLnTx/>
+                        <a:uFillTx/>
+                        <a:latin typeface="Segoe UI"/>
+                        <a:ea typeface="+mn-ea"/>
+                        <a:cs typeface="+mn-cs"/>
+                      </a:endParaRPr>
+                    </a:p>
+                  </a:txBody>
+                  <a:tcPr>
+                    <a:solidFill>
+                      <a:schemeClr val="accent3">
+                        <a:lumMod val="40000"/>
+                        <a:lumOff val="60000"/>
+                      </a:schemeClr>
+                    </a:solidFill>
+                  </a:tcPr>
+                </a:tc>
+                <a:extLst>
+                  <a:ext uri="{0D108BD9-81ED-4DB2-BD59-A6C34878D82A}">
+                    <a16:rowId xmlns:a16="http://schemas.microsoft.com/office/drawing/2014/main" val="1856244339"/>
+                  </a:ext>
+                </a:extLst>
+              </a:tr>
+              <a:tr h="370840">
+                <a:tc>
+                  <a:txBody>
+                    <a:bodyPr/>
+                    <a:lstStyle/>
+                    <a:p>
+                      <a:pPr marL="0" marR="0" lvl="0" indent="0" algn="ctr" defTabSz="932742" rtl="0" eaLnBrk="1" fontAlgn="auto" latinLnBrk="0" hangingPunct="1">
+                        <a:lnSpc>
+                          <a:spcPct val="100000"/>
+                        </a:lnSpc>
+                        <a:spcBef>
+                          <a:spcPts val="0"/>
+                        </a:spcBef>
+                        <a:spcAft>
+                          <a:spcPts val="0"/>
+                        </a:spcAft>
+                        <a:buClrTx/>
+                        <a:buSzTx/>
+                        <a:buFontTx/>
+                        <a:buNone/>
+                        <a:tabLst/>
+                        <a:defRPr/>
+                      </a:pPr>
+                      <a:r>
+                        <a:rPr kumimoji="0" lang="en-GB" sz="1800" b="0" i="0" u="none" strike="noStrike" kern="1200" cap="none" spc="0" normalizeH="0" baseline="0" noProof="0">
+                          <a:ln>
+                            <a:noFill/>
+                          </a:ln>
+                          <a:solidFill>
+                            <a:srgbClr val="1A1A1A"/>
+                          </a:solidFill>
+                          <a:effectLst/>
+                          <a:uLnTx/>
+                          <a:uFillTx/>
+                          <a:latin typeface="Segoe UI"/>
+                          <a:ea typeface="+mn-ea"/>
+                          <a:cs typeface="+mn-cs"/>
+                        </a:rPr>
+                        <a:t>27/03/2022</a:t>
+                      </a:r>
+                      <a:endParaRPr kumimoji="0" lang="en-GB" sz="1800" b="0" i="0" u="none" strike="noStrike" kern="1200" cap="none" spc="0" normalizeH="0" baseline="0" noProof="0" dirty="0">
+                        <a:ln>
+                          <a:noFill/>
+                        </a:ln>
+                        <a:solidFill>
+                          <a:srgbClr val="1A1A1A"/>
+                        </a:solidFill>
+                        <a:effectLst/>
+                        <a:uLnTx/>
+                        <a:uFillTx/>
+                        <a:latin typeface="Segoe UI"/>
+                        <a:ea typeface="+mn-ea"/>
+                        <a:cs typeface="+mn-cs"/>
+                      </a:endParaRPr>
+                    </a:p>
+                  </a:txBody>
+                  <a:tcPr/>
+                </a:tc>
+                <a:tc>
+                  <a:txBody>
+                    <a:bodyPr/>
+                    <a:lstStyle/>
+                    <a:p>
+                      <a:pPr algn="ctr"/>
+                      <a:r>
+                        <a:rPr lang="en-GB" dirty="0"/>
+                        <a:t>00:59</a:t>
+                      </a:r>
+                    </a:p>
+                  </a:txBody>
+                  <a:tcPr/>
+                </a:tc>
+                <a:tc>
+                  <a:txBody>
+                    <a:bodyPr/>
+                    <a:lstStyle/>
+                    <a:p>
+                      <a:pPr algn="ctr"/>
+                      <a:r>
+                        <a:rPr lang="en-GB" dirty="0"/>
+                        <a:t>43</a:t>
+                      </a:r>
+                    </a:p>
+                  </a:txBody>
+                  <a:tcPr/>
+                </a:tc>
+                <a:tc>
+                  <a:txBody>
+                    <a:bodyPr/>
+                    <a:lstStyle/>
+                    <a:p>
+                      <a:pPr marL="0" marR="0" lvl="0" indent="0" algn="ctr" defTabSz="932742" rtl="0" eaLnBrk="1" fontAlgn="auto" latinLnBrk="0" hangingPunct="1">
+                        <a:lnSpc>
+                          <a:spcPct val="100000"/>
+                        </a:lnSpc>
+                        <a:spcBef>
+                          <a:spcPts val="0"/>
+                        </a:spcBef>
+                        <a:spcAft>
+                          <a:spcPts val="0"/>
+                        </a:spcAft>
+                        <a:buClrTx/>
+                        <a:buSzTx/>
+                        <a:buFontTx/>
+                        <a:buNone/>
+                        <a:tabLst/>
+                        <a:defRPr/>
+                      </a:pPr>
+                      <a:r>
+                        <a:rPr kumimoji="0" lang="en-GB" sz="1800" b="0" i="0" u="none" strike="noStrike" kern="1200" cap="none" spc="0" normalizeH="0" baseline="0" noProof="0">
+                          <a:ln>
+                            <a:noFill/>
+                          </a:ln>
+                          <a:solidFill>
+                            <a:srgbClr val="1A1A1A"/>
+                          </a:solidFill>
+                          <a:effectLst/>
+                          <a:uLnTx/>
+                          <a:uFillTx/>
+                          <a:latin typeface="Segoe UI"/>
+                          <a:ea typeface="+mn-ea"/>
+                          <a:cs typeface="+mn-cs"/>
+                        </a:rPr>
+                        <a:t>Yes</a:t>
+                      </a:r>
+                      <a:endParaRPr kumimoji="0" lang="en-GB" sz="1800" b="0" i="0" u="none" strike="noStrike" kern="1200" cap="none" spc="0" normalizeH="0" baseline="0" noProof="0" dirty="0">
+                        <a:ln>
+                          <a:noFill/>
+                        </a:ln>
+                        <a:solidFill>
+                          <a:srgbClr val="1A1A1A"/>
+                        </a:solidFill>
+                        <a:effectLst/>
+                        <a:uLnTx/>
+                        <a:uFillTx/>
+                        <a:latin typeface="Segoe UI"/>
+                        <a:ea typeface="+mn-ea"/>
+                        <a:cs typeface="+mn-cs"/>
+                      </a:endParaRPr>
+                    </a:p>
+                  </a:txBody>
+                  <a:tcPr>
+                    <a:solidFill>
+                      <a:schemeClr val="accent3">
+                        <a:lumMod val="40000"/>
+                        <a:lumOff val="60000"/>
+                      </a:schemeClr>
+                    </a:solidFill>
+                  </a:tcPr>
+                </a:tc>
+                <a:tc>
+                  <a:txBody>
+                    <a:bodyPr/>
+                    <a:lstStyle/>
+                    <a:p>
+                      <a:pPr marL="0" marR="0" lvl="0" indent="0" algn="ctr" defTabSz="932742" rtl="0" eaLnBrk="1" fontAlgn="auto" latinLnBrk="0" hangingPunct="1">
+                        <a:lnSpc>
+                          <a:spcPct val="100000"/>
+                        </a:lnSpc>
+                        <a:spcBef>
+                          <a:spcPts val="0"/>
+                        </a:spcBef>
+                        <a:spcAft>
+                          <a:spcPts val="0"/>
+                        </a:spcAft>
+                        <a:buClrTx/>
+                        <a:buSzTx/>
+                        <a:buFontTx/>
+                        <a:buNone/>
+                        <a:tabLst/>
+                        <a:defRPr/>
+                      </a:pPr>
+                      <a:r>
+                        <a:rPr kumimoji="0" lang="en-GB" sz="1800" b="0" i="0" u="none" strike="noStrike" kern="1200" cap="none" spc="0" normalizeH="0" baseline="0" noProof="0" dirty="0">
+                          <a:ln>
+                            <a:noFill/>
+                          </a:ln>
+                          <a:solidFill>
+                            <a:srgbClr val="1A1A1A"/>
+                          </a:solidFill>
+                          <a:effectLst/>
+                          <a:uLnTx/>
+                          <a:uFillTx/>
+                          <a:latin typeface="Segoe UI"/>
+                          <a:ea typeface="+mn-ea"/>
+                          <a:cs typeface="+mn-cs"/>
+                        </a:rPr>
+                        <a:t>Yes</a:t>
+                      </a:r>
+                    </a:p>
+                  </a:txBody>
+                  <a:tcPr>
+                    <a:solidFill>
+                      <a:schemeClr val="accent3">
+                        <a:lumMod val="40000"/>
+                        <a:lumOff val="60000"/>
+                      </a:schemeClr>
+                    </a:solidFill>
+                  </a:tcPr>
+                </a:tc>
+                <a:extLst>
+                  <a:ext uri="{0D108BD9-81ED-4DB2-BD59-A6C34878D82A}">
+                    <a16:rowId xmlns:a16="http://schemas.microsoft.com/office/drawing/2014/main" val="3166630662"/>
+                  </a:ext>
+                </a:extLst>
+              </a:tr>
+              <a:tr h="370840">
+                <a:tc>
+                  <a:txBody>
+                    <a:bodyPr/>
+                    <a:lstStyle/>
+                    <a:p>
+                      <a:pPr marL="0" marR="0" lvl="0" indent="0" algn="ctr" defTabSz="932742" rtl="0" eaLnBrk="1" fontAlgn="auto" latinLnBrk="0" hangingPunct="1">
+                        <a:lnSpc>
+                          <a:spcPct val="100000"/>
+                        </a:lnSpc>
+                        <a:spcBef>
+                          <a:spcPts val="0"/>
+                        </a:spcBef>
+                        <a:spcAft>
+                          <a:spcPts val="0"/>
+                        </a:spcAft>
+                        <a:buClrTx/>
+                        <a:buSzTx/>
+                        <a:buFontTx/>
+                        <a:buNone/>
+                        <a:tabLst/>
+                        <a:defRPr/>
+                      </a:pPr>
+                      <a:r>
+                        <a:rPr kumimoji="0" lang="en-GB" sz="1800" b="0" i="0" u="none" strike="noStrike" kern="1200" cap="none" spc="0" normalizeH="0" baseline="0" noProof="0">
+                          <a:ln>
+                            <a:noFill/>
+                          </a:ln>
+                          <a:solidFill>
+                            <a:srgbClr val="1A1A1A"/>
+                          </a:solidFill>
+                          <a:effectLst/>
+                          <a:uLnTx/>
+                          <a:uFillTx/>
+                          <a:latin typeface="Segoe UI"/>
+                          <a:ea typeface="+mn-ea"/>
+                          <a:cs typeface="+mn-cs"/>
+                        </a:rPr>
+                        <a:t>27/03/2022</a:t>
+                      </a:r>
+                      <a:endParaRPr kumimoji="0" lang="en-GB" sz="1800" b="0" i="0" u="none" strike="noStrike" kern="1200" cap="none" spc="0" normalizeH="0" baseline="0" noProof="0" dirty="0">
+                        <a:ln>
+                          <a:noFill/>
+                        </a:ln>
+                        <a:solidFill>
+                          <a:srgbClr val="1A1A1A"/>
+                        </a:solidFill>
+                        <a:effectLst/>
+                        <a:uLnTx/>
+                        <a:uFillTx/>
+                        <a:latin typeface="Segoe UI"/>
+                        <a:ea typeface="+mn-ea"/>
+                        <a:cs typeface="+mn-cs"/>
+                      </a:endParaRPr>
+                    </a:p>
+                  </a:txBody>
+                  <a:tcPr/>
+                </a:tc>
+                <a:tc>
+                  <a:txBody>
+                    <a:bodyPr/>
+                    <a:lstStyle/>
+                    <a:p>
+                      <a:pPr algn="ctr"/>
+                      <a:r>
+                        <a:rPr lang="en-GB" dirty="0"/>
+                        <a:t>01:30</a:t>
+                      </a:r>
+                    </a:p>
+                  </a:txBody>
+                  <a:tcPr/>
+                </a:tc>
+                <a:tc>
+                  <a:txBody>
+                    <a:bodyPr/>
+                    <a:lstStyle/>
+                    <a:p>
+                      <a:pPr algn="ctr"/>
+                      <a:r>
+                        <a:rPr lang="en-GB" dirty="0"/>
+                        <a:t>2</a:t>
+                      </a:r>
+                    </a:p>
+                  </a:txBody>
+                  <a:tcPr/>
+                </a:tc>
+                <a:tc>
+                  <a:txBody>
+                    <a:bodyPr/>
+                    <a:lstStyle/>
+                    <a:p>
+                      <a:pPr marL="0" marR="0" lvl="0" indent="0" algn="ctr" defTabSz="932742" rtl="0" eaLnBrk="1" fontAlgn="auto" latinLnBrk="0" hangingPunct="1">
+                        <a:lnSpc>
+                          <a:spcPct val="100000"/>
+                        </a:lnSpc>
+                        <a:spcBef>
+                          <a:spcPts val="0"/>
+                        </a:spcBef>
+                        <a:spcAft>
+                          <a:spcPts val="0"/>
+                        </a:spcAft>
+                        <a:buClrTx/>
+                        <a:buSzTx/>
+                        <a:buFontTx/>
+                        <a:buNone/>
+                        <a:tabLst/>
+                        <a:defRPr/>
+                      </a:pPr>
+                      <a:r>
+                        <a:rPr kumimoji="0" lang="en-GB" sz="1800" b="0" i="0" u="none" strike="noStrike" kern="1200" cap="none" spc="0" normalizeH="0" baseline="0" noProof="0" dirty="0">
+                          <a:ln>
+                            <a:noFill/>
+                          </a:ln>
+                          <a:solidFill>
+                            <a:srgbClr val="1A1A1A"/>
+                          </a:solidFill>
+                          <a:effectLst/>
+                          <a:uLnTx/>
+                          <a:uFillTx/>
+                          <a:latin typeface="Segoe UI"/>
+                          <a:ea typeface="+mn-ea"/>
+                          <a:cs typeface="+mn-cs"/>
+                        </a:rPr>
+                        <a:t>No, clock change</a:t>
+                      </a:r>
+                    </a:p>
+                  </a:txBody>
+                  <a:tcPr>
+                    <a:solidFill>
+                      <a:schemeClr val="accent4">
+                        <a:lumMod val="40000"/>
+                        <a:lumOff val="60000"/>
+                      </a:schemeClr>
+                    </a:solidFill>
+                  </a:tcPr>
+                </a:tc>
+                <a:tc>
+                  <a:txBody>
+                    <a:bodyPr/>
+                    <a:lstStyle/>
+                    <a:p>
+                      <a:pPr marL="0" marR="0" lvl="0" indent="0" algn="ctr" defTabSz="932742" rtl="0" eaLnBrk="1" fontAlgn="auto" latinLnBrk="0" hangingPunct="1">
+                        <a:lnSpc>
+                          <a:spcPct val="100000"/>
+                        </a:lnSpc>
+                        <a:spcBef>
+                          <a:spcPts val="0"/>
+                        </a:spcBef>
+                        <a:spcAft>
+                          <a:spcPts val="0"/>
+                        </a:spcAft>
+                        <a:buClrTx/>
+                        <a:buSzTx/>
+                        <a:buFontTx/>
+                        <a:buNone/>
+                        <a:tabLst/>
+                        <a:defRPr/>
+                      </a:pPr>
+                      <a:r>
+                        <a:rPr kumimoji="0" lang="en-GB" sz="1800" b="0" i="0" u="none" strike="noStrike" kern="1200" cap="none" spc="0" normalizeH="0" baseline="0" noProof="0" dirty="0">
+                          <a:ln>
+                            <a:noFill/>
+                          </a:ln>
+                          <a:solidFill>
+                            <a:srgbClr val="1A1A1A"/>
+                          </a:solidFill>
+                          <a:effectLst/>
+                          <a:uLnTx/>
+                          <a:uFillTx/>
+                          <a:latin typeface="Segoe UI"/>
+                          <a:ea typeface="+mn-ea"/>
+                          <a:cs typeface="+mn-cs"/>
+                        </a:rPr>
+                        <a:t>No</a:t>
+                      </a:r>
+                    </a:p>
+                  </a:txBody>
+                  <a:tcPr>
+                    <a:solidFill>
+                      <a:schemeClr val="accent4">
+                        <a:lumMod val="40000"/>
+                        <a:lumOff val="60000"/>
+                      </a:schemeClr>
+                    </a:solidFill>
+                  </a:tcPr>
+                </a:tc>
+                <a:extLst>
+                  <a:ext uri="{0D108BD9-81ED-4DB2-BD59-A6C34878D82A}">
+                    <a16:rowId xmlns:a16="http://schemas.microsoft.com/office/drawing/2014/main" val="649638530"/>
+                  </a:ext>
+                </a:extLst>
+              </a:tr>
+              <a:tr h="370840">
+                <a:tc>
+                  <a:txBody>
+                    <a:bodyPr/>
+                    <a:lstStyle/>
+                    <a:p>
+                      <a:pPr marL="0" marR="0" lvl="0" indent="0" algn="ctr" defTabSz="932742" rtl="0" eaLnBrk="1" fontAlgn="auto" latinLnBrk="0" hangingPunct="1">
+                        <a:lnSpc>
+                          <a:spcPct val="100000"/>
+                        </a:lnSpc>
+                        <a:spcBef>
+                          <a:spcPts val="0"/>
+                        </a:spcBef>
+                        <a:spcAft>
+                          <a:spcPts val="0"/>
+                        </a:spcAft>
+                        <a:buClrTx/>
+                        <a:buSzTx/>
+                        <a:buFontTx/>
+                        <a:buNone/>
+                        <a:tabLst/>
+                        <a:defRPr/>
+                      </a:pPr>
+                      <a:r>
+                        <a:rPr kumimoji="0" lang="en-GB" sz="1800" b="0" i="0" u="none" strike="noStrike" kern="1200" cap="none" spc="0" normalizeH="0" baseline="0" noProof="0">
+                          <a:ln>
+                            <a:noFill/>
+                          </a:ln>
+                          <a:solidFill>
+                            <a:srgbClr val="1A1A1A"/>
+                          </a:solidFill>
+                          <a:effectLst/>
+                          <a:uLnTx/>
+                          <a:uFillTx/>
+                          <a:latin typeface="Segoe UI"/>
+                          <a:ea typeface="+mn-ea"/>
+                          <a:cs typeface="+mn-cs"/>
+                        </a:rPr>
+                        <a:t>27/03/2022</a:t>
+                      </a:r>
+                      <a:endParaRPr kumimoji="0" lang="en-GB" sz="1800" b="0" i="0" u="none" strike="noStrike" kern="1200" cap="none" spc="0" normalizeH="0" baseline="0" noProof="0" dirty="0">
+                        <a:ln>
+                          <a:noFill/>
+                        </a:ln>
+                        <a:solidFill>
+                          <a:srgbClr val="1A1A1A"/>
+                        </a:solidFill>
+                        <a:effectLst/>
+                        <a:uLnTx/>
+                        <a:uFillTx/>
+                        <a:latin typeface="Segoe UI"/>
+                        <a:ea typeface="+mn-ea"/>
+                        <a:cs typeface="+mn-cs"/>
+                      </a:endParaRPr>
+                    </a:p>
+                  </a:txBody>
+                  <a:tcPr/>
+                </a:tc>
+                <a:tc>
+                  <a:txBody>
+                    <a:bodyPr/>
+                    <a:lstStyle/>
+                    <a:p>
+                      <a:pPr algn="ctr"/>
+                      <a:r>
+                        <a:rPr lang="en-GB" dirty="0"/>
+                        <a:t>02:00</a:t>
+                      </a:r>
+                    </a:p>
+                  </a:txBody>
+                  <a:tcPr/>
+                </a:tc>
+                <a:tc>
+                  <a:txBody>
+                    <a:bodyPr/>
+                    <a:lstStyle/>
+                    <a:p>
+                      <a:pPr algn="ctr"/>
+                      <a:r>
+                        <a:rPr lang="en-GB" dirty="0"/>
+                        <a:t>6</a:t>
+                      </a:r>
+                    </a:p>
+                  </a:txBody>
+                  <a:tcPr/>
+                </a:tc>
+                <a:tc>
+                  <a:txBody>
+                    <a:bodyPr/>
+                    <a:lstStyle/>
+                    <a:p>
+                      <a:pPr marL="0" marR="0" lvl="0" indent="0" algn="ctr" defTabSz="932742" rtl="0" eaLnBrk="1" fontAlgn="auto" latinLnBrk="0" hangingPunct="1">
+                        <a:lnSpc>
+                          <a:spcPct val="100000"/>
+                        </a:lnSpc>
+                        <a:spcBef>
+                          <a:spcPts val="0"/>
+                        </a:spcBef>
+                        <a:spcAft>
+                          <a:spcPts val="0"/>
+                        </a:spcAft>
+                        <a:buClrTx/>
+                        <a:buSzTx/>
+                        <a:buFontTx/>
+                        <a:buNone/>
+                        <a:tabLst/>
+                        <a:defRPr/>
+                      </a:pPr>
+                      <a:r>
+                        <a:rPr kumimoji="0" lang="en-GB" sz="1800" b="0" i="0" u="none" strike="noStrike" kern="1200" cap="none" spc="0" normalizeH="0" baseline="0" noProof="0">
+                          <a:ln>
+                            <a:noFill/>
+                          </a:ln>
+                          <a:solidFill>
+                            <a:srgbClr val="1A1A1A"/>
+                          </a:solidFill>
+                          <a:effectLst/>
+                          <a:uLnTx/>
+                          <a:uFillTx/>
+                          <a:latin typeface="Segoe UI"/>
+                          <a:ea typeface="+mn-ea"/>
+                          <a:cs typeface="+mn-cs"/>
+                        </a:rPr>
+                        <a:t>Yes</a:t>
+                      </a:r>
+                      <a:endParaRPr kumimoji="0" lang="en-GB" sz="1800" b="0" i="0" u="none" strike="noStrike" kern="1200" cap="none" spc="0" normalizeH="0" baseline="0" noProof="0" dirty="0">
+                        <a:ln>
+                          <a:noFill/>
+                        </a:ln>
+                        <a:solidFill>
+                          <a:srgbClr val="1A1A1A"/>
+                        </a:solidFill>
+                        <a:effectLst/>
+                        <a:uLnTx/>
+                        <a:uFillTx/>
+                        <a:latin typeface="Segoe UI"/>
+                        <a:ea typeface="+mn-ea"/>
+                        <a:cs typeface="+mn-cs"/>
+                      </a:endParaRPr>
+                    </a:p>
+                  </a:txBody>
+                  <a:tcPr>
+                    <a:solidFill>
+                      <a:schemeClr val="accent3">
+                        <a:lumMod val="40000"/>
+                        <a:lumOff val="60000"/>
+                      </a:schemeClr>
+                    </a:solidFill>
+                  </a:tcPr>
+                </a:tc>
+                <a:tc>
+                  <a:txBody>
+                    <a:bodyPr/>
+                    <a:lstStyle/>
+                    <a:p>
+                      <a:pPr marL="0" marR="0" lvl="0" indent="0" algn="ctr" defTabSz="932742" rtl="0" eaLnBrk="1" fontAlgn="auto" latinLnBrk="0" hangingPunct="1">
+                        <a:lnSpc>
+                          <a:spcPct val="100000"/>
+                        </a:lnSpc>
+                        <a:spcBef>
+                          <a:spcPts val="0"/>
+                        </a:spcBef>
+                        <a:spcAft>
+                          <a:spcPts val="0"/>
+                        </a:spcAft>
+                        <a:buClrTx/>
+                        <a:buSzTx/>
+                        <a:buFontTx/>
+                        <a:buNone/>
+                        <a:tabLst/>
+                        <a:defRPr/>
+                      </a:pPr>
+                      <a:r>
+                        <a:rPr kumimoji="0" lang="en-GB" sz="1800" b="0" i="0" u="none" strike="noStrike" kern="1200" cap="none" spc="0" normalizeH="0" baseline="0" noProof="0">
+                          <a:ln>
+                            <a:noFill/>
+                          </a:ln>
+                          <a:solidFill>
+                            <a:srgbClr val="1A1A1A"/>
+                          </a:solidFill>
+                          <a:effectLst/>
+                          <a:uLnTx/>
+                          <a:uFillTx/>
+                          <a:latin typeface="Segoe UI"/>
+                          <a:ea typeface="+mn-ea"/>
+                          <a:cs typeface="+mn-cs"/>
+                        </a:rPr>
+                        <a:t>Yes</a:t>
+                      </a:r>
+                      <a:endParaRPr kumimoji="0" lang="en-GB" sz="1800" b="0" i="0" u="none" strike="noStrike" kern="1200" cap="none" spc="0" normalizeH="0" baseline="0" noProof="0" dirty="0">
+                        <a:ln>
+                          <a:noFill/>
+                        </a:ln>
+                        <a:solidFill>
+                          <a:srgbClr val="1A1A1A"/>
+                        </a:solidFill>
+                        <a:effectLst/>
+                        <a:uLnTx/>
+                        <a:uFillTx/>
+                        <a:latin typeface="Segoe UI"/>
+                        <a:ea typeface="+mn-ea"/>
+                        <a:cs typeface="+mn-cs"/>
+                      </a:endParaRPr>
+                    </a:p>
+                  </a:txBody>
+                  <a:tcPr>
+                    <a:solidFill>
+                      <a:schemeClr val="accent3">
+                        <a:lumMod val="40000"/>
+                        <a:lumOff val="60000"/>
+                      </a:schemeClr>
+                    </a:solidFill>
+                  </a:tcPr>
+                </a:tc>
+                <a:extLst>
+                  <a:ext uri="{0D108BD9-81ED-4DB2-BD59-A6C34878D82A}">
+                    <a16:rowId xmlns:a16="http://schemas.microsoft.com/office/drawing/2014/main" val="3513149770"/>
+                  </a:ext>
+                </a:extLst>
+              </a:tr>
+              <a:tr h="370840">
+                <a:tc>
+                  <a:txBody>
+                    <a:bodyPr/>
+                    <a:lstStyle/>
+                    <a:p>
+                      <a:pPr marL="0" marR="0" lvl="0" indent="0" algn="ctr" defTabSz="932742" rtl="0" eaLnBrk="1" fontAlgn="auto" latinLnBrk="0" hangingPunct="1">
+                        <a:lnSpc>
+                          <a:spcPct val="100000"/>
+                        </a:lnSpc>
+                        <a:spcBef>
+                          <a:spcPts val="0"/>
+                        </a:spcBef>
+                        <a:spcAft>
+                          <a:spcPts val="0"/>
+                        </a:spcAft>
+                        <a:buClrTx/>
+                        <a:buSzTx/>
+                        <a:buFontTx/>
+                        <a:buNone/>
+                        <a:tabLst/>
+                        <a:defRPr/>
+                      </a:pPr>
+                      <a:r>
+                        <a:rPr kumimoji="0" lang="en-GB" sz="1800" b="0" i="0" u="none" strike="noStrike" kern="1200" cap="none" spc="0" normalizeH="0" baseline="0" noProof="0" dirty="0">
+                          <a:ln>
+                            <a:noFill/>
+                          </a:ln>
+                          <a:solidFill>
+                            <a:srgbClr val="1A1A1A"/>
+                          </a:solidFill>
+                          <a:effectLst/>
+                          <a:uLnTx/>
+                          <a:uFillTx/>
+                          <a:latin typeface="Segoe UI"/>
+                          <a:ea typeface="+mn-ea"/>
+                          <a:cs typeface="+mn-cs"/>
+                        </a:rPr>
+                        <a:t>27/03/2022</a:t>
+                      </a:r>
+                    </a:p>
+                  </a:txBody>
+                  <a:tcPr/>
+                </a:tc>
+                <a:tc>
+                  <a:txBody>
+                    <a:bodyPr/>
+                    <a:lstStyle/>
+                    <a:p>
+                      <a:pPr algn="ctr"/>
+                      <a:r>
+                        <a:rPr lang="en-GB" dirty="0"/>
+                        <a:t>02:01</a:t>
+                      </a:r>
+                    </a:p>
+                  </a:txBody>
+                  <a:tcPr/>
+                </a:tc>
+                <a:tc>
+                  <a:txBody>
+                    <a:bodyPr/>
+                    <a:lstStyle/>
+                    <a:p>
+                      <a:pPr algn="ctr"/>
+                      <a:r>
+                        <a:rPr lang="en-GB" dirty="0"/>
+                        <a:t>8</a:t>
+                      </a:r>
+                    </a:p>
+                  </a:txBody>
+                  <a:tcPr/>
+                </a:tc>
+                <a:tc>
+                  <a:txBody>
+                    <a:bodyPr/>
+                    <a:lstStyle/>
+                    <a:p>
+                      <a:pPr marL="0" marR="0" lvl="0" indent="0" algn="ctr" defTabSz="932742" rtl="0" eaLnBrk="1" fontAlgn="auto" latinLnBrk="0" hangingPunct="1">
+                        <a:lnSpc>
+                          <a:spcPct val="100000"/>
+                        </a:lnSpc>
+                        <a:spcBef>
+                          <a:spcPts val="0"/>
+                        </a:spcBef>
+                        <a:spcAft>
+                          <a:spcPts val="0"/>
+                        </a:spcAft>
+                        <a:buClrTx/>
+                        <a:buSzTx/>
+                        <a:buFontTx/>
+                        <a:buNone/>
+                        <a:tabLst/>
+                        <a:defRPr/>
+                      </a:pPr>
+                      <a:r>
+                        <a:rPr kumimoji="0" lang="en-GB" sz="1800" b="0" i="0" u="none" strike="noStrike" kern="1200" cap="none" spc="0" normalizeH="0" baseline="0" noProof="0" dirty="0">
+                          <a:ln>
+                            <a:noFill/>
+                          </a:ln>
+                          <a:solidFill>
+                            <a:srgbClr val="1A1A1A"/>
+                          </a:solidFill>
+                          <a:effectLst/>
+                          <a:uLnTx/>
+                          <a:uFillTx/>
+                          <a:latin typeface="Segoe UI"/>
+                          <a:ea typeface="+mn-ea"/>
+                          <a:cs typeface="+mn-cs"/>
+                        </a:rPr>
+                        <a:t>Yes</a:t>
+                      </a:r>
+                    </a:p>
+                  </a:txBody>
+                  <a:tcPr>
+                    <a:solidFill>
+                      <a:schemeClr val="accent3">
+                        <a:lumMod val="40000"/>
+                        <a:lumOff val="60000"/>
+                      </a:schemeClr>
+                    </a:solidFill>
+                  </a:tcPr>
+                </a:tc>
+                <a:tc>
+                  <a:txBody>
+                    <a:bodyPr/>
+                    <a:lstStyle/>
+                    <a:p>
+                      <a:pPr marL="0" marR="0" lvl="0" indent="0" algn="ctr" defTabSz="932742" rtl="0" eaLnBrk="1" fontAlgn="auto" latinLnBrk="0" hangingPunct="1">
+                        <a:lnSpc>
+                          <a:spcPct val="100000"/>
+                        </a:lnSpc>
+                        <a:spcBef>
+                          <a:spcPts val="0"/>
+                        </a:spcBef>
+                        <a:spcAft>
+                          <a:spcPts val="0"/>
+                        </a:spcAft>
+                        <a:buClrTx/>
+                        <a:buSzTx/>
+                        <a:buFontTx/>
+                        <a:buNone/>
+                        <a:tabLst/>
+                        <a:defRPr/>
+                      </a:pPr>
+                      <a:r>
+                        <a:rPr kumimoji="0" lang="en-GB" sz="1800" b="0" i="0" u="none" strike="noStrike" kern="1200" cap="none" spc="0" normalizeH="0" baseline="0" noProof="0" dirty="0">
+                          <a:ln>
+                            <a:noFill/>
+                          </a:ln>
+                          <a:solidFill>
+                            <a:srgbClr val="1A1A1A"/>
+                          </a:solidFill>
+                          <a:effectLst/>
+                          <a:uLnTx/>
+                          <a:uFillTx/>
+                          <a:latin typeface="Segoe UI"/>
+                          <a:ea typeface="+mn-ea"/>
+                          <a:cs typeface="+mn-cs"/>
+                        </a:rPr>
+                        <a:t>Yes</a:t>
+                      </a:r>
+                    </a:p>
+                  </a:txBody>
+                  <a:tcPr>
+                    <a:solidFill>
+                      <a:schemeClr val="accent3">
+                        <a:lumMod val="40000"/>
+                        <a:lumOff val="60000"/>
+                      </a:schemeClr>
+                    </a:solidFill>
+                  </a:tcPr>
+                </a:tc>
+                <a:extLst>
+                  <a:ext uri="{0D108BD9-81ED-4DB2-BD59-A6C34878D82A}">
+                    <a16:rowId xmlns:a16="http://schemas.microsoft.com/office/drawing/2014/main" val="527143241"/>
+                  </a:ext>
+                </a:extLst>
+              </a:tr>
+            </a:tbl>
+          </a:graphicData>
+        </a:graphic>
+      </p:graphicFrame>
+    </p:spTree>
+    <p:extLst>
+      <p:ext uri="{BB962C8B-B14F-4D97-AF65-F5344CB8AC3E}">
+        <p14:creationId xmlns:p14="http://schemas.microsoft.com/office/powerpoint/2010/main" val="3710908881"/>
+      </p:ext>
+    </p:extLst>
+  </p:cSld>
+  <p:clrMapOvr>
+    <a:masterClrMapping/>
+  </p:clrMapOvr>
+  <p:transition>
+    <p:fade/>
+  </p:transition>
+</p:sld>
+</file>
+
+<file path=ppt/slides/slide12.xml><?xml version="1.0" encoding="utf-8"?>
+<p:sld xmlns:a="http://schemas.openxmlformats.org/drawingml/2006/main" xmlns:r="http://schemas.openxmlformats.org/officeDocument/2006/relationships" xmlns:p="http://schemas.openxmlformats.org/presentationml/2006/main">
+  <p:cSld>
+    <p:spTree>
+      <p:nvGrpSpPr>
+        <p:cNvPr id="1" name=""/>
+        <p:cNvGrpSpPr/>
+        <p:nvPr/>
+      </p:nvGrpSpPr>
+      <p:grpSpPr>
+        <a:xfrm>
+          <a:off x="0" y="0"/>
+          <a:ext cx="0" cy="0"/>
+          <a:chOff x="0" y="0"/>
+          <a:chExt cx="0" cy="0"/>
+        </a:xfrm>
+      </p:grpSpPr>
+      <p:sp>
+        <p:nvSpPr>
+          <p:cNvPr id="2" name="Title 1">
+            <a:extLst>
+              <a:ext uri="{FF2B5EF4-FFF2-40B4-BE49-F238E27FC236}">
                 <a16:creationId xmlns:a16="http://schemas.microsoft.com/office/drawing/2014/main" id="{2B9F0890-9BC1-4F92-859A-C952A1CB25BB}"/>
               </a:ext>
             </a:extLst>
@@ -16345,7 +17979,7 @@
 </p:sld>
 </file>
 
-<file path=ppt/slides/slide11.xml><?xml version="1.0" encoding="utf-8"?>
+<file path=ppt/slides/slide13.xml><?xml version="1.0" encoding="utf-8"?>
 <p:sld xmlns:a="http://schemas.openxmlformats.org/drawingml/2006/main" xmlns:r="http://schemas.openxmlformats.org/officeDocument/2006/relationships" xmlns:p="http://schemas.openxmlformats.org/presentationml/2006/main">
   <p:cSld>
     <p:spTree>
@@ -16824,7 +18458,7 @@
 </p:sld>
 </file>
 
-<file path=ppt/slides/slide12.xml><?xml version="1.0" encoding="utf-8"?>
+<file path=ppt/slides/slide14.xml><?xml version="1.0" encoding="utf-8"?>
 <p:sld xmlns:a="http://schemas.openxmlformats.org/drawingml/2006/main" xmlns:r="http://schemas.openxmlformats.org/officeDocument/2006/relationships" xmlns:p="http://schemas.openxmlformats.org/presentationml/2006/main">
   <p:cSld>
     <p:spTree>
@@ -17780,7 +19414,7 @@
 </p:sld>
 </file>
 
-<file path=ppt/slides/slide13.xml><?xml version="1.0" encoding="utf-8"?>
+<file path=ppt/slides/slide15.xml><?xml version="1.0" encoding="utf-8"?>
 <p:sld xmlns:a="http://schemas.openxmlformats.org/drawingml/2006/main" xmlns:r="http://schemas.openxmlformats.org/officeDocument/2006/relationships" xmlns:p="http://schemas.openxmlformats.org/presentationml/2006/main">
   <p:cSld>
     <p:spTree>
@@ -18259,7 +19893,7 @@
 </p:sld>
 </file>
 
-<file path=ppt/slides/slide14.xml><?xml version="1.0" encoding="utf-8"?>
+<file path=ppt/slides/slide16.xml><?xml version="1.0" encoding="utf-8"?>
 <p:sld xmlns:a="http://schemas.openxmlformats.org/drawingml/2006/main" xmlns:r="http://schemas.openxmlformats.org/officeDocument/2006/relationships" xmlns:p="http://schemas.openxmlformats.org/presentationml/2006/main">
   <p:cSld>
     <p:spTree>
@@ -18671,7 +20305,7 @@
 </p:sld>
 </file>
 
-<file path=ppt/slides/slide15.xml><?xml version="1.0" encoding="utf-8"?>
+<file path=ppt/slides/slide17.xml><?xml version="1.0" encoding="utf-8"?>
 <p:sld xmlns:a="http://schemas.openxmlformats.org/drawingml/2006/main" xmlns:r="http://schemas.openxmlformats.org/officeDocument/2006/relationships" xmlns:p="http://schemas.openxmlformats.org/presentationml/2006/main">
   <p:cSld>
     <p:spTree>
@@ -18764,14 +20398,14 @@
           <p:nvPr>
             <p:extLst>
               <p:ext uri="{D42A27DB-BD31-4B8C-83A1-F6EECF244321}">
-                <p14:modId xmlns:p14="http://schemas.microsoft.com/office/powerpoint/2010/main" val="4076279918"/>
+                <p14:modId xmlns:p14="http://schemas.microsoft.com/office/powerpoint/2010/main" val="4101819828"/>
               </p:ext>
             </p:extLst>
           </p:nvPr>
         </p:nvGraphicFramePr>
         <p:xfrm>
-          <a:off x="584200" y="1981140"/>
-          <a:ext cx="11018520" cy="4528940"/>
+          <a:off x="583746" y="1981140"/>
+          <a:ext cx="11018974" cy="4528940"/>
         </p:xfrm>
         <a:graphic>
           <a:graphicData uri="http://schemas.openxmlformats.org/drawingml/2006/table">
@@ -18780,7 +20414,7 @@
                 <a:tableStyleId>{5C22544A-7EE6-4342-B048-85BDC9FD1C3A}</a:tableStyleId>
               </a:tblPr>
               <a:tblGrid>
-                <a:gridCol w="3403600">
+                <a:gridCol w="3404054">
                   <a:extLst>
                     <a:ext uri="{9D8B030D-6E8A-4147-A177-3AD203B41FA5}">
                       <a16:colId xmlns:a16="http://schemas.microsoft.com/office/drawing/2014/main" val="721410355"/>
@@ -19639,7 +21273,7 @@
 </p:sld>
 </file>
 
-<file path=ppt/slides/slide16.xml><?xml version="1.0" encoding="utf-8"?>
+<file path=ppt/slides/slide18.xml><?xml version="1.0" encoding="utf-8"?>
 <p:sld xmlns:a="http://schemas.openxmlformats.org/drawingml/2006/main" xmlns:r="http://schemas.openxmlformats.org/officeDocument/2006/relationships" xmlns:p="http://schemas.openxmlformats.org/presentationml/2006/main">
   <p:cSld>
     <p:spTree>
@@ -20208,7 +21842,7 @@
 </p:sld>
 </file>
 
-<file path=ppt/slides/slide17.xml><?xml version="1.0" encoding="utf-8"?>
+<file path=ppt/slides/slide19.xml><?xml version="1.0" encoding="utf-8"?>
 <p:sld xmlns:a="http://schemas.openxmlformats.org/drawingml/2006/main" xmlns:r="http://schemas.openxmlformats.org/officeDocument/2006/relationships" xmlns:p="http://schemas.openxmlformats.org/presentationml/2006/main">
   <p:cSld>
     <p:spTree>
@@ -20344,7 +21978,202 @@
 </p:sld>
 </file>
 
-<file path=ppt/slides/slide18.xml><?xml version="1.0" encoding="utf-8"?>
+<file path=ppt/slides/slide2.xml><?xml version="1.0" encoding="utf-8"?>
+<p:sld xmlns:a="http://schemas.openxmlformats.org/drawingml/2006/main" xmlns:r="http://schemas.openxmlformats.org/officeDocument/2006/relationships" xmlns:p="http://schemas.openxmlformats.org/presentationml/2006/main">
+  <p:cSld>
+    <p:spTree>
+      <p:nvGrpSpPr>
+        <p:cNvPr id="1" name=""/>
+        <p:cNvGrpSpPr/>
+        <p:nvPr/>
+      </p:nvGrpSpPr>
+      <p:grpSpPr>
+        <a:xfrm>
+          <a:off x="0" y="0"/>
+          <a:ext cx="0" cy="0"/>
+          <a:chOff x="0" y="0"/>
+          <a:chExt cx="0" cy="0"/>
+        </a:xfrm>
+      </p:grpSpPr>
+      <p:sp>
+        <p:nvSpPr>
+          <p:cNvPr id="4" name="Title 3">
+            <a:extLst>
+              <a:ext uri="{FF2B5EF4-FFF2-40B4-BE49-F238E27FC236}">
+                <a16:creationId xmlns:a16="http://schemas.microsoft.com/office/drawing/2014/main" id="{79E81251-9937-4FA2-B6E6-E5ADAB83FE47}"/>
+              </a:ext>
+            </a:extLst>
+          </p:cNvPr>
+          <p:cNvSpPr>
+            <a:spLocks noGrp="1"/>
+          </p:cNvSpPr>
+          <p:nvPr>
+            <p:ph type="title"/>
+          </p:nvPr>
+        </p:nvSpPr>
+        <p:spPr/>
+        <p:txBody>
+          <a:bodyPr/>
+          <a:lstStyle/>
+          <a:p>
+            <a:r>
+              <a:rPr lang="en-GB" dirty="0"/>
+              <a:t>Why Test?</a:t>
+            </a:r>
+          </a:p>
+        </p:txBody>
+      </p:sp>
+      <p:sp>
+        <p:nvSpPr>
+          <p:cNvPr id="5" name="Text Placeholder 4">
+            <a:extLst>
+              <a:ext uri="{FF2B5EF4-FFF2-40B4-BE49-F238E27FC236}">
+                <a16:creationId xmlns:a16="http://schemas.microsoft.com/office/drawing/2014/main" id="{E06A7475-5C7D-4EB6-9297-DABE6F2281AD}"/>
+              </a:ext>
+            </a:extLst>
+          </p:cNvPr>
+          <p:cNvSpPr>
+            <a:spLocks noGrp="1"/>
+          </p:cNvSpPr>
+          <p:nvPr>
+            <p:ph type="body" sz="quarter" idx="10"/>
+          </p:nvPr>
+        </p:nvSpPr>
+        <p:spPr>
+          <a:xfrm>
+            <a:off x="584200" y="1435497"/>
+            <a:ext cx="11018520" cy="3311676"/>
+          </a:xfrm>
+        </p:spPr>
+        <p:txBody>
+          <a:bodyPr/>
+          <a:lstStyle/>
+          <a:p>
+            <a:r>
+              <a:rPr lang="en-GB" dirty="0"/>
+              <a:t>Quality</a:t>
+            </a:r>
+          </a:p>
+          <a:p>
+            <a:pPr lvl="1"/>
+            <a:r>
+              <a:rPr lang="en-GB" dirty="0"/>
+              <a:t>Prevent degradation</a:t>
+            </a:r>
+          </a:p>
+          <a:p>
+            <a:pPr lvl="1"/>
+            <a:r>
+              <a:rPr lang="en-GB" dirty="0"/>
+              <a:t>Set gates on release processes</a:t>
+            </a:r>
+          </a:p>
+          <a:p>
+            <a:r>
+              <a:rPr lang="en-GB" dirty="0"/>
+              <a:t>Confidence</a:t>
+            </a:r>
+          </a:p>
+          <a:p>
+            <a:pPr lvl="1"/>
+            <a:r>
+              <a:rPr lang="en-GB" dirty="0"/>
+              <a:t>Repeatability</a:t>
+            </a:r>
+          </a:p>
+          <a:p>
+            <a:pPr lvl="1"/>
+            <a:r>
+              <a:rPr lang="en-GB" dirty="0"/>
+              <a:t>Works first time every time</a:t>
+            </a:r>
+          </a:p>
+          <a:p>
+            <a:r>
+              <a:rPr lang="en-GB" dirty="0"/>
+              <a:t>Security</a:t>
+            </a:r>
+          </a:p>
+          <a:p>
+            <a:pPr lvl="1"/>
+            <a:r>
+              <a:rPr lang="en-GB" dirty="0"/>
+              <a:t>Spot unauthorised changes</a:t>
+            </a:r>
+          </a:p>
+        </p:txBody>
+      </p:sp>
+      <p:pic>
+        <p:nvPicPr>
+          <p:cNvPr id="3" name="Picture 2" descr="Graphical user interface, text, application, email&#10;&#10;Description automatically generated">
+            <a:extLst>
+              <a:ext uri="{FF2B5EF4-FFF2-40B4-BE49-F238E27FC236}">
+                <a16:creationId xmlns:a16="http://schemas.microsoft.com/office/drawing/2014/main" id="{F836D242-4A3B-4DF9-B5A7-9B98DAF4E572}"/>
+              </a:ext>
+            </a:extLst>
+          </p:cNvPr>
+          <p:cNvPicPr>
+            <a:picLocks noChangeAspect="1"/>
+          </p:cNvPicPr>
+          <p:nvPr/>
+        </p:nvPicPr>
+        <p:blipFill>
+          <a:blip r:embed="rId2"/>
+          <a:stretch>
+            <a:fillRect/>
+          </a:stretch>
+        </p:blipFill>
+        <p:spPr>
+          <a:xfrm>
+            <a:off x="4726471" y="-1159328"/>
+            <a:ext cx="12574617" cy="8278586"/>
+          </a:xfrm>
+          <a:prstGeom prst="roundRect">
+            <a:avLst>
+              <a:gd name="adj" fmla="val 16667"/>
+            </a:avLst>
+          </a:prstGeom>
+          <a:ln>
+            <a:noFill/>
+          </a:ln>
+          <a:effectLst>
+            <a:outerShdw blurRad="152400" dist="12000" dir="900000" sy="98000" kx="110000" ky="200000" algn="tl" rotWithShape="0">
+              <a:srgbClr val="000000">
+                <a:alpha val="30000"/>
+              </a:srgbClr>
+            </a:outerShdw>
+          </a:effectLst>
+          <a:scene3d>
+            <a:camera prst="perspectiveRelaxed">
+              <a:rot lat="19800000" lon="1200000" rev="20820000"/>
+            </a:camera>
+            <a:lightRig rig="threePt" dir="t"/>
+          </a:scene3d>
+          <a:sp3d contourW="6350" prstMaterial="matte">
+            <a:bevelT w="101600" h="101600"/>
+            <a:contourClr>
+              <a:srgbClr val="969696"/>
+            </a:contourClr>
+          </a:sp3d>
+        </p:spPr>
+      </p:pic>
+    </p:spTree>
+    <p:extLst>
+      <p:ext uri="{BB962C8B-B14F-4D97-AF65-F5344CB8AC3E}">
+        <p14:creationId xmlns:p14="http://schemas.microsoft.com/office/powerpoint/2010/main" val="2428800786"/>
+      </p:ext>
+    </p:extLst>
+  </p:cSld>
+  <p:clrMapOvr>
+    <a:masterClrMapping/>
+  </p:clrMapOvr>
+  <p:transition>
+    <p:fade/>
+  </p:transition>
+</p:sld>
+</file>
+
+<file path=ppt/slides/slide20.xml><?xml version="1.0" encoding="utf-8"?>
 <p:sld xmlns:a="http://schemas.openxmlformats.org/drawingml/2006/main" xmlns:r="http://schemas.openxmlformats.org/officeDocument/2006/relationships" xmlns:p="http://schemas.openxmlformats.org/presentationml/2006/main">
   <p:cSld>
     <p:spTree>
@@ -26383,7 +28212,7 @@
 </p:sld>
 </file>
 
-<file path=ppt/slides/slide19.xml><?xml version="1.0" encoding="utf-8"?>
+<file path=ppt/slides/slide21.xml><?xml version="1.0" encoding="utf-8"?>
 <p:sld xmlns:a="http://schemas.openxmlformats.org/drawingml/2006/main" xmlns:r="http://schemas.openxmlformats.org/officeDocument/2006/relationships" xmlns:p="http://schemas.openxmlformats.org/presentationml/2006/main">
   <p:cSld>
     <p:bg>
@@ -26430,201 +28259,6 @@
       </p:transition>
     </mc:Fallback>
   </mc:AlternateContent>
-</p:sld>
-</file>
-
-<file path=ppt/slides/slide2.xml><?xml version="1.0" encoding="utf-8"?>
-<p:sld xmlns:a="http://schemas.openxmlformats.org/drawingml/2006/main" xmlns:r="http://schemas.openxmlformats.org/officeDocument/2006/relationships" xmlns:p="http://schemas.openxmlformats.org/presentationml/2006/main">
-  <p:cSld>
-    <p:spTree>
-      <p:nvGrpSpPr>
-        <p:cNvPr id="1" name=""/>
-        <p:cNvGrpSpPr/>
-        <p:nvPr/>
-      </p:nvGrpSpPr>
-      <p:grpSpPr>
-        <a:xfrm>
-          <a:off x="0" y="0"/>
-          <a:ext cx="0" cy="0"/>
-          <a:chOff x="0" y="0"/>
-          <a:chExt cx="0" cy="0"/>
-        </a:xfrm>
-      </p:grpSpPr>
-      <p:sp>
-        <p:nvSpPr>
-          <p:cNvPr id="4" name="Title 3">
-            <a:extLst>
-              <a:ext uri="{FF2B5EF4-FFF2-40B4-BE49-F238E27FC236}">
-                <a16:creationId xmlns:a16="http://schemas.microsoft.com/office/drawing/2014/main" id="{79E81251-9937-4FA2-B6E6-E5ADAB83FE47}"/>
-              </a:ext>
-            </a:extLst>
-          </p:cNvPr>
-          <p:cNvSpPr>
-            <a:spLocks noGrp="1"/>
-          </p:cNvSpPr>
-          <p:nvPr>
-            <p:ph type="title"/>
-          </p:nvPr>
-        </p:nvSpPr>
-        <p:spPr/>
-        <p:txBody>
-          <a:bodyPr/>
-          <a:lstStyle/>
-          <a:p>
-            <a:r>
-              <a:rPr lang="en-GB" dirty="0"/>
-              <a:t>Why Test?</a:t>
-            </a:r>
-          </a:p>
-        </p:txBody>
-      </p:sp>
-      <p:sp>
-        <p:nvSpPr>
-          <p:cNvPr id="5" name="Text Placeholder 4">
-            <a:extLst>
-              <a:ext uri="{FF2B5EF4-FFF2-40B4-BE49-F238E27FC236}">
-                <a16:creationId xmlns:a16="http://schemas.microsoft.com/office/drawing/2014/main" id="{E06A7475-5C7D-4EB6-9297-DABE6F2281AD}"/>
-              </a:ext>
-            </a:extLst>
-          </p:cNvPr>
-          <p:cNvSpPr>
-            <a:spLocks noGrp="1"/>
-          </p:cNvSpPr>
-          <p:nvPr>
-            <p:ph type="body" sz="quarter" idx="10"/>
-          </p:nvPr>
-        </p:nvSpPr>
-        <p:spPr>
-          <a:xfrm>
-            <a:off x="584200" y="1435497"/>
-            <a:ext cx="11018520" cy="3311676"/>
-          </a:xfrm>
-        </p:spPr>
-        <p:txBody>
-          <a:bodyPr/>
-          <a:lstStyle/>
-          <a:p>
-            <a:r>
-              <a:rPr lang="en-GB" dirty="0"/>
-              <a:t>Quality</a:t>
-            </a:r>
-          </a:p>
-          <a:p>
-            <a:pPr lvl="1"/>
-            <a:r>
-              <a:rPr lang="en-GB" dirty="0"/>
-              <a:t>Prevent degradation</a:t>
-            </a:r>
-          </a:p>
-          <a:p>
-            <a:pPr lvl="1"/>
-            <a:r>
-              <a:rPr lang="en-GB" dirty="0"/>
-              <a:t>Set gates on release processes</a:t>
-            </a:r>
-          </a:p>
-          <a:p>
-            <a:r>
-              <a:rPr lang="en-GB" dirty="0"/>
-              <a:t>Confidence</a:t>
-            </a:r>
-          </a:p>
-          <a:p>
-            <a:pPr lvl="1"/>
-            <a:r>
-              <a:rPr lang="en-GB" dirty="0"/>
-              <a:t>Repeatability</a:t>
-            </a:r>
-          </a:p>
-          <a:p>
-            <a:pPr lvl="1"/>
-            <a:r>
-              <a:rPr lang="en-GB" dirty="0"/>
-              <a:t>Works first time every time</a:t>
-            </a:r>
-          </a:p>
-          <a:p>
-            <a:r>
-              <a:rPr lang="en-GB" dirty="0"/>
-              <a:t>Security</a:t>
-            </a:r>
-          </a:p>
-          <a:p>
-            <a:pPr lvl="1"/>
-            <a:r>
-              <a:rPr lang="en-GB" dirty="0"/>
-              <a:t>Spot unauthorised changes</a:t>
-            </a:r>
-          </a:p>
-        </p:txBody>
-      </p:sp>
-      <p:pic>
-        <p:nvPicPr>
-          <p:cNvPr id="3" name="Picture 2" descr="Graphical user interface, text, application, email&#10;&#10;Description automatically generated">
-            <a:extLst>
-              <a:ext uri="{FF2B5EF4-FFF2-40B4-BE49-F238E27FC236}">
-                <a16:creationId xmlns:a16="http://schemas.microsoft.com/office/drawing/2014/main" id="{F836D242-4A3B-4DF9-B5A7-9B98DAF4E572}"/>
-              </a:ext>
-            </a:extLst>
-          </p:cNvPr>
-          <p:cNvPicPr>
-            <a:picLocks noChangeAspect="1"/>
-          </p:cNvPicPr>
-          <p:nvPr/>
-        </p:nvPicPr>
-        <p:blipFill>
-          <a:blip r:embed="rId2"/>
-          <a:stretch>
-            <a:fillRect/>
-          </a:stretch>
-        </p:blipFill>
-        <p:spPr>
-          <a:xfrm>
-            <a:off x="4726471" y="-1159328"/>
-            <a:ext cx="12574617" cy="8278586"/>
-          </a:xfrm>
-          <a:prstGeom prst="roundRect">
-            <a:avLst>
-              <a:gd name="adj" fmla="val 16667"/>
-            </a:avLst>
-          </a:prstGeom>
-          <a:ln>
-            <a:noFill/>
-          </a:ln>
-          <a:effectLst>
-            <a:outerShdw blurRad="152400" dist="12000" dir="900000" sy="98000" kx="110000" ky="200000" algn="tl" rotWithShape="0">
-              <a:srgbClr val="000000">
-                <a:alpha val="30000"/>
-              </a:srgbClr>
-            </a:outerShdw>
-          </a:effectLst>
-          <a:scene3d>
-            <a:camera prst="perspectiveRelaxed">
-              <a:rot lat="19800000" lon="1200000" rev="20820000"/>
-            </a:camera>
-            <a:lightRig rig="threePt" dir="t"/>
-          </a:scene3d>
-          <a:sp3d contourW="6350" prstMaterial="matte">
-            <a:bevelT w="101600" h="101600"/>
-            <a:contourClr>
-              <a:srgbClr val="969696"/>
-            </a:contourClr>
-          </a:sp3d>
-        </p:spPr>
-      </p:pic>
-    </p:spTree>
-    <p:extLst>
-      <p:ext uri="{BB962C8B-B14F-4D97-AF65-F5344CB8AC3E}">
-        <p14:creationId xmlns:p14="http://schemas.microsoft.com/office/powerpoint/2010/main" val="2428800786"/>
-      </p:ext>
-    </p:extLst>
-  </p:cSld>
-  <p:clrMapOvr>
-    <a:masterClrMapping/>
-  </p:clrMapOvr>
-  <p:transition>
-    <p:fade/>
-  </p:transition>
 </p:sld>
 </file>
 
@@ -27045,6 +28679,228 @@
           <p:cNvPr id="2" name="Title 1">
             <a:extLst>
               <a:ext uri="{FF2B5EF4-FFF2-40B4-BE49-F238E27FC236}">
+                <a16:creationId xmlns:a16="http://schemas.microsoft.com/office/drawing/2014/main" id="{11F0995D-0CF9-47D5-86D6-EE447B5F0AE8}"/>
+              </a:ext>
+            </a:extLst>
+          </p:cNvPr>
+          <p:cNvSpPr>
+            <a:spLocks noGrp="1"/>
+          </p:cNvSpPr>
+          <p:nvPr>
+            <p:ph type="title"/>
+          </p:nvPr>
+        </p:nvSpPr>
+        <p:spPr/>
+        <p:txBody>
+          <a:bodyPr/>
+          <a:lstStyle/>
+          <a:p>
+            <a:r>
+              <a:rPr lang="en-GB" dirty="0"/>
+              <a:t>Integration with Azure DevOps</a:t>
+            </a:r>
+          </a:p>
+        </p:txBody>
+      </p:sp>
+      <p:sp>
+        <p:nvSpPr>
+          <p:cNvPr id="3" name="Text Placeholder 2">
+            <a:extLst>
+              <a:ext uri="{FF2B5EF4-FFF2-40B4-BE49-F238E27FC236}">
+                <a16:creationId xmlns:a16="http://schemas.microsoft.com/office/drawing/2014/main" id="{419BABC7-2770-43A7-9D4C-B6A64F9BF58A}"/>
+              </a:ext>
+            </a:extLst>
+          </p:cNvPr>
+          <p:cNvSpPr>
+            <a:spLocks noGrp="1"/>
+          </p:cNvSpPr>
+          <p:nvPr>
+            <p:ph type="body" sz="quarter" idx="10"/>
+          </p:nvPr>
+        </p:nvSpPr>
+        <p:spPr>
+          <a:xfrm>
+            <a:off x="584200" y="1435497"/>
+            <a:ext cx="11018520" cy="2942344"/>
+          </a:xfrm>
+        </p:spPr>
+        <p:txBody>
+          <a:bodyPr/>
+          <a:lstStyle/>
+          <a:p>
+            <a:r>
+              <a:rPr lang="en-GB" dirty="0"/>
+              <a:t>Support for various frameworks</a:t>
+            </a:r>
+          </a:p>
+          <a:p>
+            <a:pPr lvl="1"/>
+            <a:r>
+              <a:rPr lang="en-GB" dirty="0"/>
+              <a:t>Generic XML for </a:t>
+            </a:r>
+            <a:r>
+              <a:rPr lang="en-GB" dirty="0" err="1"/>
+              <a:t>MSTest</a:t>
+            </a:r>
+            <a:r>
+              <a:rPr lang="en-GB" dirty="0"/>
+              <a:t> v2, </a:t>
+            </a:r>
+            <a:r>
+              <a:rPr lang="en-GB" dirty="0" err="1"/>
+              <a:t>NUnit</a:t>
+            </a:r>
+            <a:r>
+              <a:rPr lang="en-GB" dirty="0"/>
+              <a:t>, and </a:t>
+            </a:r>
+            <a:r>
+              <a:rPr lang="en-GB" dirty="0" err="1"/>
+              <a:t>xUnit</a:t>
+            </a:r>
+            <a:endParaRPr lang="en-GB" dirty="0"/>
+          </a:p>
+          <a:p>
+            <a:pPr lvl="1"/>
+            <a:r>
+              <a:rPr lang="en-GB" dirty="0"/>
+              <a:t>Dedicated tasks for e.g. </a:t>
+            </a:r>
+            <a:r>
+              <a:rPr lang="en-GB" dirty="0" err="1"/>
+              <a:t>VSTest</a:t>
+            </a:r>
+            <a:endParaRPr lang="en-GB" dirty="0"/>
+          </a:p>
+          <a:p>
+            <a:pPr lvl="1"/>
+            <a:r>
+              <a:rPr lang="en-GB" dirty="0"/>
+              <a:t>Generic results import for e.g. </a:t>
+            </a:r>
+            <a:r>
+              <a:rPr lang="en-GB" dirty="0" err="1"/>
+              <a:t>PyTest</a:t>
+            </a:r>
+            <a:r>
+              <a:rPr lang="en-GB" dirty="0"/>
+              <a:t> XML</a:t>
+            </a:r>
+          </a:p>
+          <a:p>
+            <a:r>
+              <a:rPr lang="en-GB" dirty="0"/>
+              <a:t>Tests run either on agent or remote</a:t>
+            </a:r>
+          </a:p>
+          <a:p>
+            <a:pPr lvl="1"/>
+            <a:r>
+              <a:rPr lang="en-GB" dirty="0"/>
+              <a:t>Remote testing can be imported as file</a:t>
+            </a:r>
+          </a:p>
+          <a:p>
+            <a:r>
+              <a:rPr lang="en-GB" dirty="0"/>
+              <a:t>Network access can be a consideration</a:t>
+            </a:r>
+          </a:p>
+        </p:txBody>
+      </p:sp>
+      <p:pic>
+        <p:nvPicPr>
+          <p:cNvPr id="5" name="Picture 4" descr="Graphical user interface, text, application, email&#10;&#10;Description automatically generated">
+            <a:extLst>
+              <a:ext uri="{FF2B5EF4-FFF2-40B4-BE49-F238E27FC236}">
+                <a16:creationId xmlns:a16="http://schemas.microsoft.com/office/drawing/2014/main" id="{3BD88DA4-3ED7-43E2-8786-FBC4BD6B3D99}"/>
+              </a:ext>
+            </a:extLst>
+          </p:cNvPr>
+          <p:cNvPicPr>
+            <a:picLocks noChangeAspect="1"/>
+          </p:cNvPicPr>
+          <p:nvPr/>
+        </p:nvPicPr>
+        <p:blipFill>
+          <a:blip r:embed="rId2"/>
+          <a:stretch>
+            <a:fillRect/>
+          </a:stretch>
+        </p:blipFill>
+        <p:spPr>
+          <a:xfrm>
+            <a:off x="6977627" y="2044476"/>
+            <a:ext cx="6115364" cy="4356324"/>
+          </a:xfrm>
+          <a:prstGeom prst="rect">
+            <a:avLst/>
+          </a:prstGeom>
+          <a:ln w="127000" cap="rnd">
+            <a:solidFill>
+              <a:srgbClr val="FFFFFF"/>
+            </a:solidFill>
+          </a:ln>
+          <a:effectLst>
+            <a:outerShdw blurRad="76200" dist="95250" dir="10500000" sx="97000" sy="23000" kx="900000" algn="br" rotWithShape="0">
+              <a:srgbClr val="000000">
+                <a:alpha val="20000"/>
+              </a:srgbClr>
+            </a:outerShdw>
+          </a:effectLst>
+          <a:scene3d>
+            <a:camera prst="orthographicFront"/>
+            <a:lightRig rig="twoPt" dir="t">
+              <a:rot lat="0" lon="0" rev="7800000"/>
+            </a:lightRig>
+          </a:scene3d>
+          <a:sp3d contourW="6350">
+            <a:bevelT w="50800" h="16510"/>
+            <a:contourClr>
+              <a:srgbClr val="C0C0C0"/>
+            </a:contourClr>
+          </a:sp3d>
+        </p:spPr>
+      </p:pic>
+    </p:spTree>
+    <p:extLst>
+      <p:ext uri="{BB962C8B-B14F-4D97-AF65-F5344CB8AC3E}">
+        <p14:creationId xmlns:p14="http://schemas.microsoft.com/office/powerpoint/2010/main" val="3332837905"/>
+      </p:ext>
+    </p:extLst>
+  </p:cSld>
+  <p:clrMapOvr>
+    <a:masterClrMapping/>
+  </p:clrMapOvr>
+  <p:transition>
+    <p:fade/>
+  </p:transition>
+</p:sld>
+</file>
+
+<file path=ppt/slides/slide6.xml><?xml version="1.0" encoding="utf-8"?>
+<p:sld xmlns:a="http://schemas.openxmlformats.org/drawingml/2006/main" xmlns:r="http://schemas.openxmlformats.org/officeDocument/2006/relationships" xmlns:p="http://schemas.openxmlformats.org/presentationml/2006/main">
+  <p:cSld>
+    <p:spTree>
+      <p:nvGrpSpPr>
+        <p:cNvPr id="1" name=""/>
+        <p:cNvGrpSpPr/>
+        <p:nvPr/>
+      </p:nvGrpSpPr>
+      <p:grpSpPr>
+        <a:xfrm>
+          <a:off x="0" y="0"/>
+          <a:ext cx="0" cy="0"/>
+          <a:chOff x="0" y="0"/>
+          <a:chExt cx="0" cy="0"/>
+        </a:xfrm>
+      </p:grpSpPr>
+      <p:sp>
+        <p:nvSpPr>
+          <p:cNvPr id="2" name="Title 1">
+            <a:extLst>
+              <a:ext uri="{FF2B5EF4-FFF2-40B4-BE49-F238E27FC236}">
                 <a16:creationId xmlns:a16="http://schemas.microsoft.com/office/drawing/2014/main" id="{4145752D-020B-4925-B8EC-D628790B373A}"/>
               </a:ext>
             </a:extLst>
@@ -27835,7 +29691,7 @@
 </p:sld>
 </file>
 
-<file path=ppt/slides/slide6.xml><?xml version="1.0" encoding="utf-8"?>
+<file path=ppt/slides/slide7.xml><?xml version="1.0" encoding="utf-8"?>
 <p:sld xmlns:a="http://schemas.openxmlformats.org/drawingml/2006/main" xmlns:r="http://schemas.openxmlformats.org/officeDocument/2006/relationships" xmlns:p="http://schemas.openxmlformats.org/presentationml/2006/main">
   <p:cSld>
     <p:spTree>
@@ -27899,7 +29755,7 @@
         <p:spPr>
           <a:xfrm>
             <a:off x="584200" y="1435497"/>
-            <a:ext cx="11018520" cy="1908215"/>
+            <a:ext cx="11018520" cy="3533275"/>
           </a:xfrm>
         </p:spPr>
         <p:txBody>
@@ -27937,6 +29793,33 @@
             <a:r>
               <a:rPr lang="en-GB" dirty="0"/>
               <a:t>Stored in the repo and/or in a dedicated test location</a:t>
+            </a:r>
+          </a:p>
+          <a:p>
+            <a:r>
+              <a:rPr lang="en-GB" dirty="0"/>
+              <a:t>Performance Testing</a:t>
+            </a:r>
+          </a:p>
+          <a:p>
+            <a:pPr lvl="1"/>
+            <a:r>
+              <a:rPr lang="en-GB" dirty="0"/>
+              <a:t>Known size representative data sets can be used for performance checking</a:t>
+            </a:r>
+          </a:p>
+          <a:p>
+            <a:pPr lvl="1"/>
+            <a:r>
+              <a:rPr lang="en-GB" dirty="0"/>
+              <a:t>Actual live data can be used for performance against current production</a:t>
+            </a:r>
+          </a:p>
+          <a:p>
+            <a:pPr lvl="1"/>
+            <a:r>
+              <a:rPr lang="en-GB" dirty="0"/>
+              <a:t>Ephemeral environment for parallel processing</a:t>
             </a:r>
           </a:p>
         </p:txBody>
@@ -27957,7 +29840,166 @@
 </p:sld>
 </file>
 
-<file path=ppt/slides/slide7.xml><?xml version="1.0" encoding="utf-8"?>
+<file path=ppt/slides/slide8.xml><?xml version="1.0" encoding="utf-8"?>
+<p:sld xmlns:a="http://schemas.openxmlformats.org/drawingml/2006/main" xmlns:r="http://schemas.openxmlformats.org/officeDocument/2006/relationships" xmlns:p="http://schemas.openxmlformats.org/presentationml/2006/main">
+  <p:cSld>
+    <p:spTree>
+      <p:nvGrpSpPr>
+        <p:cNvPr id="1" name=""/>
+        <p:cNvGrpSpPr/>
+        <p:nvPr/>
+      </p:nvGrpSpPr>
+      <p:grpSpPr>
+        <a:xfrm>
+          <a:off x="0" y="0"/>
+          <a:ext cx="0" cy="0"/>
+          <a:chOff x="0" y="0"/>
+          <a:chExt cx="0" cy="0"/>
+        </a:xfrm>
+      </p:grpSpPr>
+      <p:sp>
+        <p:nvSpPr>
+          <p:cNvPr id="2" name="Title 1">
+            <a:extLst>
+              <a:ext uri="{FF2B5EF4-FFF2-40B4-BE49-F238E27FC236}">
+                <a16:creationId xmlns:a16="http://schemas.microsoft.com/office/drawing/2014/main" id="{CA3A459D-7E8F-4E8F-B639-A9A5BC019C37}"/>
+              </a:ext>
+            </a:extLst>
+          </p:cNvPr>
+          <p:cNvSpPr>
+            <a:spLocks noGrp="1"/>
+          </p:cNvSpPr>
+          <p:nvPr>
+            <p:ph type="title"/>
+          </p:nvPr>
+        </p:nvSpPr>
+        <p:spPr/>
+        <p:txBody>
+          <a:bodyPr/>
+          <a:lstStyle/>
+          <a:p>
+            <a:r>
+              <a:rPr lang="en-GB" dirty="0"/>
+              <a:t>Ephemeral environments</a:t>
+            </a:r>
+          </a:p>
+        </p:txBody>
+      </p:sp>
+      <p:sp>
+        <p:nvSpPr>
+          <p:cNvPr id="3" name="Text Placeholder 2">
+            <a:extLst>
+              <a:ext uri="{FF2B5EF4-FFF2-40B4-BE49-F238E27FC236}">
+                <a16:creationId xmlns:a16="http://schemas.microsoft.com/office/drawing/2014/main" id="{E3D7F77D-6825-468B-8634-0D86653BF652}"/>
+              </a:ext>
+            </a:extLst>
+          </p:cNvPr>
+          <p:cNvSpPr>
+            <a:spLocks noGrp="1"/>
+          </p:cNvSpPr>
+          <p:nvPr>
+            <p:ph type="body" sz="quarter" idx="10"/>
+          </p:nvPr>
+        </p:nvSpPr>
+        <p:spPr>
+          <a:xfrm>
+            <a:off x="584200" y="1435497"/>
+            <a:ext cx="11018520" cy="2215991"/>
+          </a:xfrm>
+        </p:spPr>
+        <p:txBody>
+          <a:bodyPr/>
+          <a:lstStyle/>
+          <a:p>
+            <a:r>
+              <a:rPr lang="en-GB" dirty="0"/>
+              <a:t>Spin up new environment</a:t>
+            </a:r>
+          </a:p>
+          <a:p>
+            <a:pPr lvl="1"/>
+            <a:r>
+              <a:rPr lang="en-GB" dirty="0"/>
+              <a:t>UAT testers can point to new endpoint</a:t>
+            </a:r>
+          </a:p>
+          <a:p>
+            <a:pPr lvl="1"/>
+            <a:r>
+              <a:rPr lang="en-GB" dirty="0"/>
+              <a:t>Performance benchmarks run with</a:t>
+            </a:r>
+            <a:br>
+              <a:rPr lang="en-GB" dirty="0"/>
+            </a:br>
+            <a:r>
+              <a:rPr lang="en-GB" dirty="0"/>
+              <a:t>standard data set</a:t>
+            </a:r>
+          </a:p>
+          <a:p>
+            <a:pPr lvl="1"/>
+            <a:r>
+              <a:rPr lang="en-GB" dirty="0"/>
+              <a:t>Multiple SKU sizes can be tried out</a:t>
+            </a:r>
+          </a:p>
+          <a:p>
+            <a:pPr lvl="1"/>
+            <a:r>
+              <a:rPr lang="en-GB" dirty="0"/>
+              <a:t>Cluster sizes can be tested</a:t>
+            </a:r>
+          </a:p>
+        </p:txBody>
+      </p:sp>
+      <p:pic>
+        <p:nvPicPr>
+          <p:cNvPr id="5" name="Picture 4" descr="Diagram&#10;&#10;Description automatically generated">
+            <a:extLst>
+              <a:ext uri="{FF2B5EF4-FFF2-40B4-BE49-F238E27FC236}">
+                <a16:creationId xmlns:a16="http://schemas.microsoft.com/office/drawing/2014/main" id="{5B5CF7CC-56DD-4E20-A0BF-C402049E8CCF}"/>
+              </a:ext>
+            </a:extLst>
+          </p:cNvPr>
+          <p:cNvPicPr>
+            <a:picLocks noChangeAspect="1"/>
+          </p:cNvPicPr>
+          <p:nvPr/>
+        </p:nvPicPr>
+        <p:blipFill>
+          <a:blip r:embed="rId2"/>
+          <a:stretch>
+            <a:fillRect/>
+          </a:stretch>
+        </p:blipFill>
+        <p:spPr>
+          <a:xfrm>
+            <a:off x="5745473" y="1478270"/>
+            <a:ext cx="6187453" cy="4922530"/>
+          </a:xfrm>
+          <a:prstGeom prst="rect">
+            <a:avLst/>
+          </a:prstGeom>
+        </p:spPr>
+      </p:pic>
+    </p:spTree>
+    <p:extLst>
+      <p:ext uri="{BB962C8B-B14F-4D97-AF65-F5344CB8AC3E}">
+        <p14:creationId xmlns:p14="http://schemas.microsoft.com/office/powerpoint/2010/main" val="956118076"/>
+      </p:ext>
+    </p:extLst>
+  </p:cSld>
+  <p:clrMapOvr>
+    <a:masterClrMapping/>
+  </p:clrMapOvr>
+  <p:transition>
+    <p:fade/>
+  </p:transition>
+</p:sld>
+</file>
+
+<file path=ppt/slides/slide9.xml><?xml version="1.0" encoding="utf-8"?>
 <p:sld xmlns:a="http://schemas.openxmlformats.org/drawingml/2006/main" xmlns:r="http://schemas.openxmlformats.org/officeDocument/2006/relationships" xmlns:p="http://schemas.openxmlformats.org/presentationml/2006/main">
   <p:cSld>
     <p:spTree>
@@ -28057,1636 +30099,6 @@
     <p:extLst>
       <p:ext uri="{BB962C8B-B14F-4D97-AF65-F5344CB8AC3E}">
         <p14:creationId xmlns:p14="http://schemas.microsoft.com/office/powerpoint/2010/main" val="819758256"/>
-      </p:ext>
-    </p:extLst>
-  </p:cSld>
-  <p:clrMapOvr>
-    <a:masterClrMapping/>
-  </p:clrMapOvr>
-  <p:transition>
-    <p:fade/>
-  </p:transition>
-</p:sld>
-</file>
-
-<file path=ppt/slides/slide8.xml><?xml version="1.0" encoding="utf-8"?>
-<p:sld xmlns:a="http://schemas.openxmlformats.org/drawingml/2006/main" xmlns:r="http://schemas.openxmlformats.org/officeDocument/2006/relationships" xmlns:p="http://schemas.openxmlformats.org/presentationml/2006/main">
-  <p:cSld>
-    <p:spTree>
-      <p:nvGrpSpPr>
-        <p:cNvPr id="1" name=""/>
-        <p:cNvGrpSpPr/>
-        <p:nvPr/>
-      </p:nvGrpSpPr>
-      <p:grpSpPr>
-        <a:xfrm>
-          <a:off x="0" y="0"/>
-          <a:ext cx="0" cy="0"/>
-          <a:chOff x="0" y="0"/>
-          <a:chExt cx="0" cy="0"/>
-        </a:xfrm>
-      </p:grpSpPr>
-      <p:sp>
-        <p:nvSpPr>
-          <p:cNvPr id="2" name="Title 1">
-            <a:extLst>
-              <a:ext uri="{FF2B5EF4-FFF2-40B4-BE49-F238E27FC236}">
-                <a16:creationId xmlns:a16="http://schemas.microsoft.com/office/drawing/2014/main" id="{696165C6-27A1-4C49-9F4A-23D983A0E458}"/>
-              </a:ext>
-            </a:extLst>
-          </p:cNvPr>
-          <p:cNvSpPr>
-            <a:spLocks noGrp="1"/>
-          </p:cNvSpPr>
-          <p:nvPr>
-            <p:ph type="title"/>
-          </p:nvPr>
-        </p:nvSpPr>
-        <p:spPr/>
-        <p:txBody>
-          <a:bodyPr/>
-          <a:lstStyle/>
-          <a:p>
-            <a:r>
-              <a:rPr lang="en-GB" dirty="0"/>
-              <a:t>Test Areas</a:t>
-            </a:r>
-          </a:p>
-        </p:txBody>
-      </p:sp>
-      <p:sp>
-        <p:nvSpPr>
-          <p:cNvPr id="3" name="Text Placeholder 2">
-            <a:extLst>
-              <a:ext uri="{FF2B5EF4-FFF2-40B4-BE49-F238E27FC236}">
-                <a16:creationId xmlns:a16="http://schemas.microsoft.com/office/drawing/2014/main" id="{00623A20-4A63-4676-B8AB-C147AA39A383}"/>
-              </a:ext>
-            </a:extLst>
-          </p:cNvPr>
-          <p:cNvSpPr>
-            <a:spLocks noGrp="1"/>
-          </p:cNvSpPr>
-          <p:nvPr>
-            <p:ph type="body" sz="quarter" idx="10"/>
-          </p:nvPr>
-        </p:nvSpPr>
-        <p:spPr>
-          <a:xfrm>
-            <a:off x="584200" y="1435497"/>
-            <a:ext cx="11018520" cy="2499146"/>
-          </a:xfrm>
-        </p:spPr>
-        <p:txBody>
-          <a:bodyPr/>
-          <a:lstStyle/>
-          <a:p>
-            <a:r>
-              <a:rPr lang="en-GB" dirty="0"/>
-              <a:t>Dates</a:t>
-            </a:r>
-          </a:p>
-          <a:p>
-            <a:r>
-              <a:rPr lang="en-GB" dirty="0"/>
-              <a:t>Data Types</a:t>
-            </a:r>
-          </a:p>
-          <a:p>
-            <a:r>
-              <a:rPr lang="en-GB" dirty="0"/>
-              <a:t>Schema</a:t>
-            </a:r>
-          </a:p>
-          <a:p>
-            <a:r>
-              <a:rPr lang="en-GB" dirty="0"/>
-              <a:t>Infrastructure deployment success</a:t>
-            </a:r>
-          </a:p>
-          <a:p>
-            <a:r>
-              <a:rPr lang="en-GB" dirty="0"/>
-              <a:t>Pipeline speed/capacity</a:t>
-            </a:r>
-          </a:p>
-        </p:txBody>
-      </p:sp>
-    </p:spTree>
-    <p:extLst>
-      <p:ext uri="{BB962C8B-B14F-4D97-AF65-F5344CB8AC3E}">
-        <p14:creationId xmlns:p14="http://schemas.microsoft.com/office/powerpoint/2010/main" val="3735633958"/>
-      </p:ext>
-    </p:extLst>
-  </p:cSld>
-  <p:clrMapOvr>
-    <a:masterClrMapping/>
-  </p:clrMapOvr>
-  <p:transition>
-    <p:fade/>
-  </p:transition>
-</p:sld>
-</file>
-
-<file path=ppt/slides/slide9.xml><?xml version="1.0" encoding="utf-8"?>
-<p:sld xmlns:a="http://schemas.openxmlformats.org/drawingml/2006/main" xmlns:r="http://schemas.openxmlformats.org/officeDocument/2006/relationships" xmlns:p="http://schemas.openxmlformats.org/presentationml/2006/main">
-  <p:cSld>
-    <p:spTree>
-      <p:nvGrpSpPr>
-        <p:cNvPr id="1" name=""/>
-        <p:cNvGrpSpPr/>
-        <p:nvPr/>
-      </p:nvGrpSpPr>
-      <p:grpSpPr>
-        <a:xfrm>
-          <a:off x="0" y="0"/>
-          <a:ext cx="0" cy="0"/>
-          <a:chOff x="0" y="0"/>
-          <a:chExt cx="0" cy="0"/>
-        </a:xfrm>
-      </p:grpSpPr>
-      <p:sp>
-        <p:nvSpPr>
-          <p:cNvPr id="2" name="Title 1">
-            <a:extLst>
-              <a:ext uri="{FF2B5EF4-FFF2-40B4-BE49-F238E27FC236}">
-                <a16:creationId xmlns:a16="http://schemas.microsoft.com/office/drawing/2014/main" id="{A406683A-959A-44D3-A53F-E45ECE353DE5}"/>
-              </a:ext>
-            </a:extLst>
-          </p:cNvPr>
-          <p:cNvSpPr>
-            <a:spLocks noGrp="1"/>
-          </p:cNvSpPr>
-          <p:nvPr>
-            <p:ph type="title"/>
-          </p:nvPr>
-        </p:nvSpPr>
-        <p:spPr/>
-        <p:txBody>
-          <a:bodyPr/>
-          <a:lstStyle/>
-          <a:p>
-            <a:r>
-              <a:rPr lang="en-GB" dirty="0"/>
-              <a:t>Data Tests - Aggregations</a:t>
-            </a:r>
-          </a:p>
-        </p:txBody>
-      </p:sp>
-      <p:sp>
-        <p:nvSpPr>
-          <p:cNvPr id="3" name="Text Placeholder 2">
-            <a:extLst>
-              <a:ext uri="{FF2B5EF4-FFF2-40B4-BE49-F238E27FC236}">
-                <a16:creationId xmlns:a16="http://schemas.microsoft.com/office/drawing/2014/main" id="{B01FF65B-238B-4EEB-9AFB-BD729623867F}"/>
-              </a:ext>
-            </a:extLst>
-          </p:cNvPr>
-          <p:cNvSpPr>
-            <a:spLocks noGrp="1"/>
-          </p:cNvSpPr>
-          <p:nvPr>
-            <p:ph type="body" sz="quarter" idx="10"/>
-          </p:nvPr>
-        </p:nvSpPr>
-        <p:spPr>
-          <a:xfrm>
-            <a:off x="584200" y="1435497"/>
-            <a:ext cx="11018520" cy="2055947"/>
-          </a:xfrm>
-        </p:spPr>
-        <p:txBody>
-          <a:bodyPr/>
-          <a:lstStyle/>
-          <a:p>
-            <a:r>
-              <a:rPr lang="en-GB" dirty="0"/>
-              <a:t>Test your aggregations</a:t>
-            </a:r>
-          </a:p>
-          <a:p>
-            <a:pPr lvl="1"/>
-            <a:r>
-              <a:rPr lang="en-GB" dirty="0"/>
-              <a:t>Known good data</a:t>
-            </a:r>
-          </a:p>
-          <a:p>
-            <a:pPr lvl="1"/>
-            <a:r>
-              <a:rPr lang="en-GB" dirty="0"/>
-              <a:t>Known bad data</a:t>
-            </a:r>
-          </a:p>
-          <a:p>
-            <a:pPr lvl="1"/>
-            <a:r>
-              <a:rPr lang="en-GB" dirty="0"/>
-              <a:t>Known time ranges</a:t>
-            </a:r>
-          </a:p>
-          <a:p>
-            <a:r>
-              <a:rPr lang="en-GB" dirty="0"/>
-              <a:t>Below, the expected value for total sales is 65</a:t>
-            </a:r>
-          </a:p>
-        </p:txBody>
-      </p:sp>
-      <p:graphicFrame>
-        <p:nvGraphicFramePr>
-          <p:cNvPr id="4" name="Table 4">
-            <a:extLst>
-              <a:ext uri="{FF2B5EF4-FFF2-40B4-BE49-F238E27FC236}">
-                <a16:creationId xmlns:a16="http://schemas.microsoft.com/office/drawing/2014/main" id="{9E5919AD-46AE-4125-9A7E-7A14B35615F3}"/>
-              </a:ext>
-            </a:extLst>
-          </p:cNvPr>
-          <p:cNvGraphicFramePr>
-            <a:graphicFrameLocks noGrp="1"/>
-          </p:cNvGraphicFramePr>
-          <p:nvPr>
-            <p:extLst>
-              <p:ext uri="{D42A27DB-BD31-4B8C-83A1-F6EECF244321}">
-                <p14:modId xmlns:p14="http://schemas.microsoft.com/office/powerpoint/2010/main" val="1069046613"/>
-              </p:ext>
-            </p:extLst>
-          </p:nvPr>
-        </p:nvGraphicFramePr>
-        <p:xfrm>
-          <a:off x="698500" y="3674533"/>
-          <a:ext cx="10904220" cy="2966720"/>
-        </p:xfrm>
-        <a:graphic>
-          <a:graphicData uri="http://schemas.openxmlformats.org/drawingml/2006/table">
-            <a:tbl>
-              <a:tblPr firstRow="1" bandRow="1">
-                <a:tableStyleId>{5C22544A-7EE6-4342-B048-85BDC9FD1C3A}</a:tableStyleId>
-              </a:tblPr>
-              <a:tblGrid>
-                <a:gridCol w="1397000">
-                  <a:extLst>
-                    <a:ext uri="{9D8B030D-6E8A-4147-A177-3AD203B41FA5}">
-                      <a16:colId xmlns:a16="http://schemas.microsoft.com/office/drawing/2014/main" val="3870008085"/>
-                    </a:ext>
-                  </a:extLst>
-                </a:gridCol>
-                <a:gridCol w="1722967">
-                  <a:extLst>
-                    <a:ext uri="{9D8B030D-6E8A-4147-A177-3AD203B41FA5}">
-                      <a16:colId xmlns:a16="http://schemas.microsoft.com/office/drawing/2014/main" val="1156849591"/>
-                    </a:ext>
-                  </a:extLst>
-                </a:gridCol>
-                <a:gridCol w="2053166">
-                  <a:extLst>
-                    <a:ext uri="{9D8B030D-6E8A-4147-A177-3AD203B41FA5}">
-                      <a16:colId xmlns:a16="http://schemas.microsoft.com/office/drawing/2014/main" val="3313587052"/>
-                    </a:ext>
-                  </a:extLst>
-                </a:gridCol>
-                <a:gridCol w="2383367">
-                  <a:extLst>
-                    <a:ext uri="{9D8B030D-6E8A-4147-A177-3AD203B41FA5}">
-                      <a16:colId xmlns:a16="http://schemas.microsoft.com/office/drawing/2014/main" val="3408029281"/>
-                    </a:ext>
-                  </a:extLst>
-                </a:gridCol>
-                <a:gridCol w="3347720">
-                  <a:extLst>
-                    <a:ext uri="{9D8B030D-6E8A-4147-A177-3AD203B41FA5}">
-                      <a16:colId xmlns:a16="http://schemas.microsoft.com/office/drawing/2014/main" val="3476761653"/>
-                    </a:ext>
-                  </a:extLst>
-                </a:gridCol>
-              </a:tblGrid>
-              <a:tr h="370840">
-                <a:tc>
-                  <a:txBody>
-                    <a:bodyPr/>
-                    <a:lstStyle/>
-                    <a:p>
-                      <a:pPr algn="ctr"/>
-                      <a:r>
-                        <a:rPr lang="en-GB" dirty="0"/>
-                        <a:t>Date</a:t>
-                      </a:r>
-                    </a:p>
-                  </a:txBody>
-                  <a:tcPr/>
-                </a:tc>
-                <a:tc>
-                  <a:txBody>
-                    <a:bodyPr/>
-                    <a:lstStyle/>
-                    <a:p>
-                      <a:pPr algn="ctr"/>
-                      <a:r>
-                        <a:rPr lang="en-GB" dirty="0"/>
-                        <a:t>Time</a:t>
-                      </a:r>
-                    </a:p>
-                  </a:txBody>
-                  <a:tcPr/>
-                </a:tc>
-                <a:tc>
-                  <a:txBody>
-                    <a:bodyPr/>
-                    <a:lstStyle/>
-                    <a:p>
-                      <a:pPr algn="ctr"/>
-                      <a:r>
-                        <a:rPr lang="en-GB" dirty="0"/>
-                        <a:t>Quantity</a:t>
-                      </a:r>
-                    </a:p>
-                  </a:txBody>
-                  <a:tcPr/>
-                </a:tc>
-                <a:tc>
-                  <a:txBody>
-                    <a:bodyPr/>
-                    <a:lstStyle/>
-                    <a:p>
-                      <a:pPr algn="ctr"/>
-                      <a:r>
-                        <a:rPr lang="en-GB" dirty="0"/>
-                        <a:t>Valid?</a:t>
-                      </a:r>
-                    </a:p>
-                  </a:txBody>
-                  <a:tcPr/>
-                </a:tc>
-                <a:tc>
-                  <a:txBody>
-                    <a:bodyPr/>
-                    <a:lstStyle/>
-                    <a:p>
-                      <a:pPr algn="ctr"/>
-                      <a:r>
-                        <a:rPr lang="en-GB" dirty="0"/>
-                        <a:t>Included in daily Aggregate?</a:t>
-                      </a:r>
-                    </a:p>
-                  </a:txBody>
-                  <a:tcPr/>
-                </a:tc>
-                <a:extLst>
-                  <a:ext uri="{0D108BD9-81ED-4DB2-BD59-A6C34878D82A}">
-                    <a16:rowId xmlns:a16="http://schemas.microsoft.com/office/drawing/2014/main" val="2650429286"/>
-                  </a:ext>
-                </a:extLst>
-              </a:tr>
-              <a:tr h="370840">
-                <a:tc>
-                  <a:txBody>
-                    <a:bodyPr/>
-                    <a:lstStyle/>
-                    <a:p>
-                      <a:pPr algn="ctr"/>
-                      <a:r>
-                        <a:rPr lang="en-GB" dirty="0"/>
-                        <a:t>26/03/2022</a:t>
-                      </a:r>
-                    </a:p>
-                  </a:txBody>
-                  <a:tcPr/>
-                </a:tc>
-                <a:tc>
-                  <a:txBody>
-                    <a:bodyPr/>
-                    <a:lstStyle/>
-                    <a:p>
-                      <a:pPr algn="ctr"/>
-                      <a:r>
-                        <a:rPr lang="en-GB" dirty="0"/>
-                        <a:t>23:59</a:t>
-                      </a:r>
-                    </a:p>
-                  </a:txBody>
-                  <a:tcPr/>
-                </a:tc>
-                <a:tc>
-                  <a:txBody>
-                    <a:bodyPr/>
-                    <a:lstStyle/>
-                    <a:p>
-                      <a:pPr algn="ctr"/>
-                      <a:r>
-                        <a:rPr lang="en-GB" dirty="0"/>
-                        <a:t>1</a:t>
-                      </a:r>
-                    </a:p>
-                  </a:txBody>
-                  <a:tcPr/>
-                </a:tc>
-                <a:tc>
-                  <a:txBody>
-                    <a:bodyPr/>
-                    <a:lstStyle/>
-                    <a:p>
-                      <a:pPr algn="ctr"/>
-                      <a:r>
-                        <a:rPr lang="en-GB" dirty="0"/>
-                        <a:t>Yes</a:t>
-                      </a:r>
-                    </a:p>
-                  </a:txBody>
-                  <a:tcPr>
-                    <a:solidFill>
-                      <a:schemeClr val="accent3">
-                        <a:lumMod val="40000"/>
-                        <a:lumOff val="60000"/>
-                      </a:schemeClr>
-                    </a:solidFill>
-                  </a:tcPr>
-                </a:tc>
-                <a:tc>
-                  <a:txBody>
-                    <a:bodyPr/>
-                    <a:lstStyle/>
-                    <a:p>
-                      <a:pPr algn="ctr"/>
-                      <a:r>
-                        <a:rPr lang="en-GB" dirty="0"/>
-                        <a:t>No</a:t>
-                      </a:r>
-                    </a:p>
-                  </a:txBody>
-                  <a:tcPr>
-                    <a:solidFill>
-                      <a:schemeClr val="accent4">
-                        <a:lumMod val="40000"/>
-                        <a:lumOff val="60000"/>
-                      </a:schemeClr>
-                    </a:solidFill>
-                  </a:tcPr>
-                </a:tc>
-                <a:extLst>
-                  <a:ext uri="{0D108BD9-81ED-4DB2-BD59-A6C34878D82A}">
-                    <a16:rowId xmlns:a16="http://schemas.microsoft.com/office/drawing/2014/main" val="615849865"/>
-                  </a:ext>
-                </a:extLst>
-              </a:tr>
-              <a:tr h="370840">
-                <a:tc>
-                  <a:txBody>
-                    <a:bodyPr/>
-                    <a:lstStyle/>
-                    <a:p>
-                      <a:pPr marL="0" marR="0" lvl="0" indent="0" algn="ctr" defTabSz="932742" rtl="0" eaLnBrk="1" fontAlgn="auto" latinLnBrk="0" hangingPunct="1">
-                        <a:lnSpc>
-                          <a:spcPct val="100000"/>
-                        </a:lnSpc>
-                        <a:spcBef>
-                          <a:spcPts val="0"/>
-                        </a:spcBef>
-                        <a:spcAft>
-                          <a:spcPts val="0"/>
-                        </a:spcAft>
-                        <a:buClrTx/>
-                        <a:buSzTx/>
-                        <a:buFontTx/>
-                        <a:buNone/>
-                        <a:tabLst/>
-                        <a:defRPr/>
-                      </a:pPr>
-                      <a:r>
-                        <a:rPr lang="en-GB" dirty="0"/>
-                        <a:t>27/03/2022</a:t>
-                      </a:r>
-                    </a:p>
-                  </a:txBody>
-                  <a:tcPr/>
-                </a:tc>
-                <a:tc>
-                  <a:txBody>
-                    <a:bodyPr/>
-                    <a:lstStyle/>
-                    <a:p>
-                      <a:pPr algn="ctr"/>
-                      <a:r>
-                        <a:rPr lang="en-GB" dirty="0"/>
-                        <a:t>00:00</a:t>
-                      </a:r>
-                    </a:p>
-                  </a:txBody>
-                  <a:tcPr/>
-                </a:tc>
-                <a:tc>
-                  <a:txBody>
-                    <a:bodyPr/>
-                    <a:lstStyle/>
-                    <a:p>
-                      <a:pPr algn="ctr"/>
-                      <a:r>
-                        <a:rPr lang="en-GB" dirty="0"/>
-                        <a:t>2</a:t>
-                      </a:r>
-                    </a:p>
-                  </a:txBody>
-                  <a:tcPr/>
-                </a:tc>
-                <a:tc>
-                  <a:txBody>
-                    <a:bodyPr/>
-                    <a:lstStyle/>
-                    <a:p>
-                      <a:pPr algn="ctr"/>
-                      <a:r>
-                        <a:rPr lang="en-GB" dirty="0"/>
-                        <a:t>Yes</a:t>
-                      </a:r>
-                    </a:p>
-                  </a:txBody>
-                  <a:tcPr>
-                    <a:solidFill>
-                      <a:schemeClr val="accent3">
-                        <a:lumMod val="40000"/>
-                        <a:lumOff val="60000"/>
-                      </a:schemeClr>
-                    </a:solidFill>
-                  </a:tcPr>
-                </a:tc>
-                <a:tc>
-                  <a:txBody>
-                    <a:bodyPr/>
-                    <a:lstStyle/>
-                    <a:p>
-                      <a:pPr marL="0" marR="0" lvl="0" indent="0" algn="ctr" defTabSz="932742" rtl="0" eaLnBrk="1" fontAlgn="auto" latinLnBrk="0" hangingPunct="1">
-                        <a:lnSpc>
-                          <a:spcPct val="100000"/>
-                        </a:lnSpc>
-                        <a:spcBef>
-                          <a:spcPts val="0"/>
-                        </a:spcBef>
-                        <a:spcAft>
-                          <a:spcPts val="0"/>
-                        </a:spcAft>
-                        <a:buClrTx/>
-                        <a:buSzTx/>
-                        <a:buFontTx/>
-                        <a:buNone/>
-                        <a:tabLst/>
-                        <a:defRPr/>
-                      </a:pPr>
-                      <a:r>
-                        <a:rPr kumimoji="0" lang="en-GB" sz="1800" b="0" i="0" u="none" strike="noStrike" kern="1200" cap="none" spc="0" normalizeH="0" baseline="0" noProof="0">
-                          <a:ln>
-                            <a:noFill/>
-                          </a:ln>
-                          <a:solidFill>
-                            <a:srgbClr val="1A1A1A"/>
-                          </a:solidFill>
-                          <a:effectLst/>
-                          <a:uLnTx/>
-                          <a:uFillTx/>
-                          <a:latin typeface="Segoe UI"/>
-                          <a:ea typeface="+mn-ea"/>
-                          <a:cs typeface="+mn-cs"/>
-                        </a:rPr>
-                        <a:t>Yes</a:t>
-                      </a:r>
-                      <a:endParaRPr kumimoji="0" lang="en-GB" sz="1800" b="0" i="0" u="none" strike="noStrike" kern="1200" cap="none" spc="0" normalizeH="0" baseline="0" noProof="0" dirty="0">
-                        <a:ln>
-                          <a:noFill/>
-                        </a:ln>
-                        <a:solidFill>
-                          <a:srgbClr val="1A1A1A"/>
-                        </a:solidFill>
-                        <a:effectLst/>
-                        <a:uLnTx/>
-                        <a:uFillTx/>
-                        <a:latin typeface="Segoe UI"/>
-                        <a:ea typeface="+mn-ea"/>
-                        <a:cs typeface="+mn-cs"/>
-                      </a:endParaRPr>
-                    </a:p>
-                  </a:txBody>
-                  <a:tcPr>
-                    <a:solidFill>
-                      <a:schemeClr val="accent3">
-                        <a:lumMod val="40000"/>
-                        <a:lumOff val="60000"/>
-                      </a:schemeClr>
-                    </a:solidFill>
-                  </a:tcPr>
-                </a:tc>
-                <a:extLst>
-                  <a:ext uri="{0D108BD9-81ED-4DB2-BD59-A6C34878D82A}">
-                    <a16:rowId xmlns:a16="http://schemas.microsoft.com/office/drawing/2014/main" val="4149233034"/>
-                  </a:ext>
-                </a:extLst>
-              </a:tr>
-              <a:tr h="370840">
-                <a:tc>
-                  <a:txBody>
-                    <a:bodyPr/>
-                    <a:lstStyle/>
-                    <a:p>
-                      <a:pPr marL="0" marR="0" lvl="0" indent="0" algn="ctr" defTabSz="932742" rtl="0" eaLnBrk="1" fontAlgn="auto" latinLnBrk="0" hangingPunct="1">
-                        <a:lnSpc>
-                          <a:spcPct val="100000"/>
-                        </a:lnSpc>
-                        <a:spcBef>
-                          <a:spcPts val="0"/>
-                        </a:spcBef>
-                        <a:spcAft>
-                          <a:spcPts val="0"/>
-                        </a:spcAft>
-                        <a:buClrTx/>
-                        <a:buSzTx/>
-                        <a:buFontTx/>
-                        <a:buNone/>
-                        <a:tabLst/>
-                        <a:defRPr/>
-                      </a:pPr>
-                      <a:r>
-                        <a:rPr kumimoji="0" lang="en-GB" sz="1800" b="0" i="0" u="none" strike="noStrike" kern="1200" cap="none" spc="0" normalizeH="0" baseline="0" noProof="0">
-                          <a:ln>
-                            <a:noFill/>
-                          </a:ln>
-                          <a:solidFill>
-                            <a:srgbClr val="1A1A1A"/>
-                          </a:solidFill>
-                          <a:effectLst/>
-                          <a:uLnTx/>
-                          <a:uFillTx/>
-                          <a:latin typeface="Segoe UI"/>
-                          <a:ea typeface="+mn-ea"/>
-                          <a:cs typeface="+mn-cs"/>
-                        </a:rPr>
-                        <a:t>27/03/2022</a:t>
-                      </a:r>
-                      <a:endParaRPr kumimoji="0" lang="en-GB" sz="1800" b="0" i="0" u="none" strike="noStrike" kern="1200" cap="none" spc="0" normalizeH="0" baseline="0" noProof="0" dirty="0">
-                        <a:ln>
-                          <a:noFill/>
-                        </a:ln>
-                        <a:solidFill>
-                          <a:srgbClr val="1A1A1A"/>
-                        </a:solidFill>
-                        <a:effectLst/>
-                        <a:uLnTx/>
-                        <a:uFillTx/>
-                        <a:latin typeface="Segoe UI"/>
-                        <a:ea typeface="+mn-ea"/>
-                        <a:cs typeface="+mn-cs"/>
-                      </a:endParaRPr>
-                    </a:p>
-                  </a:txBody>
-                  <a:tcPr/>
-                </a:tc>
-                <a:tc>
-                  <a:txBody>
-                    <a:bodyPr/>
-                    <a:lstStyle/>
-                    <a:p>
-                      <a:pPr algn="ctr"/>
-                      <a:r>
-                        <a:rPr lang="en-GB" dirty="0"/>
-                        <a:t>00:01</a:t>
-                      </a:r>
-                    </a:p>
-                  </a:txBody>
-                  <a:tcPr/>
-                </a:tc>
-                <a:tc>
-                  <a:txBody>
-                    <a:bodyPr/>
-                    <a:lstStyle/>
-                    <a:p>
-                      <a:pPr algn="ctr"/>
-                      <a:r>
-                        <a:rPr lang="en-GB" dirty="0"/>
-                        <a:t>6</a:t>
-                      </a:r>
-                    </a:p>
-                  </a:txBody>
-                  <a:tcPr/>
-                </a:tc>
-                <a:tc>
-                  <a:txBody>
-                    <a:bodyPr/>
-                    <a:lstStyle/>
-                    <a:p>
-                      <a:pPr marL="0" marR="0" lvl="0" indent="0" algn="ctr" defTabSz="932742" rtl="0" eaLnBrk="1" fontAlgn="auto" latinLnBrk="0" hangingPunct="1">
-                        <a:lnSpc>
-                          <a:spcPct val="100000"/>
-                        </a:lnSpc>
-                        <a:spcBef>
-                          <a:spcPts val="0"/>
-                        </a:spcBef>
-                        <a:spcAft>
-                          <a:spcPts val="0"/>
-                        </a:spcAft>
-                        <a:buClrTx/>
-                        <a:buSzTx/>
-                        <a:buFontTx/>
-                        <a:buNone/>
-                        <a:tabLst/>
-                        <a:defRPr/>
-                      </a:pPr>
-                      <a:r>
-                        <a:rPr kumimoji="0" lang="en-GB" sz="1800" b="0" i="0" u="none" strike="noStrike" kern="1200" cap="none" spc="0" normalizeH="0" baseline="0" noProof="0" dirty="0">
-                          <a:ln>
-                            <a:noFill/>
-                          </a:ln>
-                          <a:solidFill>
-                            <a:srgbClr val="1A1A1A"/>
-                          </a:solidFill>
-                          <a:effectLst/>
-                          <a:uLnTx/>
-                          <a:uFillTx/>
-                          <a:latin typeface="Segoe UI"/>
-                          <a:ea typeface="+mn-ea"/>
-                          <a:cs typeface="+mn-cs"/>
-                        </a:rPr>
-                        <a:t>Yes</a:t>
-                      </a:r>
-                    </a:p>
-                  </a:txBody>
-                  <a:tcPr>
-                    <a:solidFill>
-                      <a:schemeClr val="accent3">
-                        <a:lumMod val="40000"/>
-                        <a:lumOff val="60000"/>
-                      </a:schemeClr>
-                    </a:solidFill>
-                  </a:tcPr>
-                </a:tc>
-                <a:tc>
-                  <a:txBody>
-                    <a:bodyPr/>
-                    <a:lstStyle/>
-                    <a:p>
-                      <a:pPr marL="0" marR="0" lvl="0" indent="0" algn="ctr" defTabSz="932742" rtl="0" eaLnBrk="1" fontAlgn="auto" latinLnBrk="0" hangingPunct="1">
-                        <a:lnSpc>
-                          <a:spcPct val="100000"/>
-                        </a:lnSpc>
-                        <a:spcBef>
-                          <a:spcPts val="0"/>
-                        </a:spcBef>
-                        <a:spcAft>
-                          <a:spcPts val="0"/>
-                        </a:spcAft>
-                        <a:buClrTx/>
-                        <a:buSzTx/>
-                        <a:buFontTx/>
-                        <a:buNone/>
-                        <a:tabLst/>
-                        <a:defRPr/>
-                      </a:pPr>
-                      <a:r>
-                        <a:rPr kumimoji="0" lang="en-GB" sz="1800" b="0" i="0" u="none" strike="noStrike" kern="1200" cap="none" spc="0" normalizeH="0" baseline="0" noProof="0">
-                          <a:ln>
-                            <a:noFill/>
-                          </a:ln>
-                          <a:solidFill>
-                            <a:srgbClr val="1A1A1A"/>
-                          </a:solidFill>
-                          <a:effectLst/>
-                          <a:uLnTx/>
-                          <a:uFillTx/>
-                          <a:latin typeface="Segoe UI"/>
-                          <a:ea typeface="+mn-ea"/>
-                          <a:cs typeface="+mn-cs"/>
-                        </a:rPr>
-                        <a:t>Yes</a:t>
-                      </a:r>
-                      <a:endParaRPr kumimoji="0" lang="en-GB" sz="1800" b="0" i="0" u="none" strike="noStrike" kern="1200" cap="none" spc="0" normalizeH="0" baseline="0" noProof="0" dirty="0">
-                        <a:ln>
-                          <a:noFill/>
-                        </a:ln>
-                        <a:solidFill>
-                          <a:srgbClr val="1A1A1A"/>
-                        </a:solidFill>
-                        <a:effectLst/>
-                        <a:uLnTx/>
-                        <a:uFillTx/>
-                        <a:latin typeface="Segoe UI"/>
-                        <a:ea typeface="+mn-ea"/>
-                        <a:cs typeface="+mn-cs"/>
-                      </a:endParaRPr>
-                    </a:p>
-                  </a:txBody>
-                  <a:tcPr>
-                    <a:solidFill>
-                      <a:schemeClr val="accent3">
-                        <a:lumMod val="40000"/>
-                        <a:lumOff val="60000"/>
-                      </a:schemeClr>
-                    </a:solidFill>
-                  </a:tcPr>
-                </a:tc>
-                <a:extLst>
-                  <a:ext uri="{0D108BD9-81ED-4DB2-BD59-A6C34878D82A}">
-                    <a16:rowId xmlns:a16="http://schemas.microsoft.com/office/drawing/2014/main" val="1856244339"/>
-                  </a:ext>
-                </a:extLst>
-              </a:tr>
-              <a:tr h="370840">
-                <a:tc>
-                  <a:txBody>
-                    <a:bodyPr/>
-                    <a:lstStyle/>
-                    <a:p>
-                      <a:pPr marL="0" marR="0" lvl="0" indent="0" algn="ctr" defTabSz="932742" rtl="0" eaLnBrk="1" fontAlgn="auto" latinLnBrk="0" hangingPunct="1">
-                        <a:lnSpc>
-                          <a:spcPct val="100000"/>
-                        </a:lnSpc>
-                        <a:spcBef>
-                          <a:spcPts val="0"/>
-                        </a:spcBef>
-                        <a:spcAft>
-                          <a:spcPts val="0"/>
-                        </a:spcAft>
-                        <a:buClrTx/>
-                        <a:buSzTx/>
-                        <a:buFontTx/>
-                        <a:buNone/>
-                        <a:tabLst/>
-                        <a:defRPr/>
-                      </a:pPr>
-                      <a:r>
-                        <a:rPr kumimoji="0" lang="en-GB" sz="1800" b="0" i="0" u="none" strike="noStrike" kern="1200" cap="none" spc="0" normalizeH="0" baseline="0" noProof="0">
-                          <a:ln>
-                            <a:noFill/>
-                          </a:ln>
-                          <a:solidFill>
-                            <a:srgbClr val="1A1A1A"/>
-                          </a:solidFill>
-                          <a:effectLst/>
-                          <a:uLnTx/>
-                          <a:uFillTx/>
-                          <a:latin typeface="Segoe UI"/>
-                          <a:ea typeface="+mn-ea"/>
-                          <a:cs typeface="+mn-cs"/>
-                        </a:rPr>
-                        <a:t>27/03/2022</a:t>
-                      </a:r>
-                      <a:endParaRPr kumimoji="0" lang="en-GB" sz="1800" b="0" i="0" u="none" strike="noStrike" kern="1200" cap="none" spc="0" normalizeH="0" baseline="0" noProof="0" dirty="0">
-                        <a:ln>
-                          <a:noFill/>
-                        </a:ln>
-                        <a:solidFill>
-                          <a:srgbClr val="1A1A1A"/>
-                        </a:solidFill>
-                        <a:effectLst/>
-                        <a:uLnTx/>
-                        <a:uFillTx/>
-                        <a:latin typeface="Segoe UI"/>
-                        <a:ea typeface="+mn-ea"/>
-                        <a:cs typeface="+mn-cs"/>
-                      </a:endParaRPr>
-                    </a:p>
-                  </a:txBody>
-                  <a:tcPr/>
-                </a:tc>
-                <a:tc>
-                  <a:txBody>
-                    <a:bodyPr/>
-                    <a:lstStyle/>
-                    <a:p>
-                      <a:pPr algn="ctr"/>
-                      <a:r>
-                        <a:rPr lang="en-GB" dirty="0"/>
-                        <a:t>00:59</a:t>
-                      </a:r>
-                    </a:p>
-                  </a:txBody>
-                  <a:tcPr/>
-                </a:tc>
-                <a:tc>
-                  <a:txBody>
-                    <a:bodyPr/>
-                    <a:lstStyle/>
-                    <a:p>
-                      <a:pPr algn="ctr"/>
-                      <a:r>
-                        <a:rPr lang="en-GB" dirty="0"/>
-                        <a:t>43</a:t>
-                      </a:r>
-                    </a:p>
-                  </a:txBody>
-                  <a:tcPr/>
-                </a:tc>
-                <a:tc>
-                  <a:txBody>
-                    <a:bodyPr/>
-                    <a:lstStyle/>
-                    <a:p>
-                      <a:pPr marL="0" marR="0" lvl="0" indent="0" algn="ctr" defTabSz="932742" rtl="0" eaLnBrk="1" fontAlgn="auto" latinLnBrk="0" hangingPunct="1">
-                        <a:lnSpc>
-                          <a:spcPct val="100000"/>
-                        </a:lnSpc>
-                        <a:spcBef>
-                          <a:spcPts val="0"/>
-                        </a:spcBef>
-                        <a:spcAft>
-                          <a:spcPts val="0"/>
-                        </a:spcAft>
-                        <a:buClrTx/>
-                        <a:buSzTx/>
-                        <a:buFontTx/>
-                        <a:buNone/>
-                        <a:tabLst/>
-                        <a:defRPr/>
-                      </a:pPr>
-                      <a:r>
-                        <a:rPr kumimoji="0" lang="en-GB" sz="1800" b="0" i="0" u="none" strike="noStrike" kern="1200" cap="none" spc="0" normalizeH="0" baseline="0" noProof="0">
-                          <a:ln>
-                            <a:noFill/>
-                          </a:ln>
-                          <a:solidFill>
-                            <a:srgbClr val="1A1A1A"/>
-                          </a:solidFill>
-                          <a:effectLst/>
-                          <a:uLnTx/>
-                          <a:uFillTx/>
-                          <a:latin typeface="Segoe UI"/>
-                          <a:ea typeface="+mn-ea"/>
-                          <a:cs typeface="+mn-cs"/>
-                        </a:rPr>
-                        <a:t>Yes</a:t>
-                      </a:r>
-                      <a:endParaRPr kumimoji="0" lang="en-GB" sz="1800" b="0" i="0" u="none" strike="noStrike" kern="1200" cap="none" spc="0" normalizeH="0" baseline="0" noProof="0" dirty="0">
-                        <a:ln>
-                          <a:noFill/>
-                        </a:ln>
-                        <a:solidFill>
-                          <a:srgbClr val="1A1A1A"/>
-                        </a:solidFill>
-                        <a:effectLst/>
-                        <a:uLnTx/>
-                        <a:uFillTx/>
-                        <a:latin typeface="Segoe UI"/>
-                        <a:ea typeface="+mn-ea"/>
-                        <a:cs typeface="+mn-cs"/>
-                      </a:endParaRPr>
-                    </a:p>
-                  </a:txBody>
-                  <a:tcPr>
-                    <a:solidFill>
-                      <a:schemeClr val="accent3">
-                        <a:lumMod val="40000"/>
-                        <a:lumOff val="60000"/>
-                      </a:schemeClr>
-                    </a:solidFill>
-                  </a:tcPr>
-                </a:tc>
-                <a:tc>
-                  <a:txBody>
-                    <a:bodyPr/>
-                    <a:lstStyle/>
-                    <a:p>
-                      <a:pPr marL="0" marR="0" lvl="0" indent="0" algn="ctr" defTabSz="932742" rtl="0" eaLnBrk="1" fontAlgn="auto" latinLnBrk="0" hangingPunct="1">
-                        <a:lnSpc>
-                          <a:spcPct val="100000"/>
-                        </a:lnSpc>
-                        <a:spcBef>
-                          <a:spcPts val="0"/>
-                        </a:spcBef>
-                        <a:spcAft>
-                          <a:spcPts val="0"/>
-                        </a:spcAft>
-                        <a:buClrTx/>
-                        <a:buSzTx/>
-                        <a:buFontTx/>
-                        <a:buNone/>
-                        <a:tabLst/>
-                        <a:defRPr/>
-                      </a:pPr>
-                      <a:r>
-                        <a:rPr kumimoji="0" lang="en-GB" sz="1800" b="0" i="0" u="none" strike="noStrike" kern="1200" cap="none" spc="0" normalizeH="0" baseline="0" noProof="0" dirty="0">
-                          <a:ln>
-                            <a:noFill/>
-                          </a:ln>
-                          <a:solidFill>
-                            <a:srgbClr val="1A1A1A"/>
-                          </a:solidFill>
-                          <a:effectLst/>
-                          <a:uLnTx/>
-                          <a:uFillTx/>
-                          <a:latin typeface="Segoe UI"/>
-                          <a:ea typeface="+mn-ea"/>
-                          <a:cs typeface="+mn-cs"/>
-                        </a:rPr>
-                        <a:t>Yes</a:t>
-                      </a:r>
-                    </a:p>
-                  </a:txBody>
-                  <a:tcPr>
-                    <a:solidFill>
-                      <a:schemeClr val="accent3">
-                        <a:lumMod val="40000"/>
-                        <a:lumOff val="60000"/>
-                      </a:schemeClr>
-                    </a:solidFill>
-                  </a:tcPr>
-                </a:tc>
-                <a:extLst>
-                  <a:ext uri="{0D108BD9-81ED-4DB2-BD59-A6C34878D82A}">
-                    <a16:rowId xmlns:a16="http://schemas.microsoft.com/office/drawing/2014/main" val="3166630662"/>
-                  </a:ext>
-                </a:extLst>
-              </a:tr>
-              <a:tr h="370840">
-                <a:tc>
-                  <a:txBody>
-                    <a:bodyPr/>
-                    <a:lstStyle/>
-                    <a:p>
-                      <a:pPr marL="0" marR="0" lvl="0" indent="0" algn="ctr" defTabSz="932742" rtl="0" eaLnBrk="1" fontAlgn="auto" latinLnBrk="0" hangingPunct="1">
-                        <a:lnSpc>
-                          <a:spcPct val="100000"/>
-                        </a:lnSpc>
-                        <a:spcBef>
-                          <a:spcPts val="0"/>
-                        </a:spcBef>
-                        <a:spcAft>
-                          <a:spcPts val="0"/>
-                        </a:spcAft>
-                        <a:buClrTx/>
-                        <a:buSzTx/>
-                        <a:buFontTx/>
-                        <a:buNone/>
-                        <a:tabLst/>
-                        <a:defRPr/>
-                      </a:pPr>
-                      <a:r>
-                        <a:rPr kumimoji="0" lang="en-GB" sz="1800" b="0" i="0" u="none" strike="noStrike" kern="1200" cap="none" spc="0" normalizeH="0" baseline="0" noProof="0">
-                          <a:ln>
-                            <a:noFill/>
-                          </a:ln>
-                          <a:solidFill>
-                            <a:srgbClr val="1A1A1A"/>
-                          </a:solidFill>
-                          <a:effectLst/>
-                          <a:uLnTx/>
-                          <a:uFillTx/>
-                          <a:latin typeface="Segoe UI"/>
-                          <a:ea typeface="+mn-ea"/>
-                          <a:cs typeface="+mn-cs"/>
-                        </a:rPr>
-                        <a:t>27/03/2022</a:t>
-                      </a:r>
-                      <a:endParaRPr kumimoji="0" lang="en-GB" sz="1800" b="0" i="0" u="none" strike="noStrike" kern="1200" cap="none" spc="0" normalizeH="0" baseline="0" noProof="0" dirty="0">
-                        <a:ln>
-                          <a:noFill/>
-                        </a:ln>
-                        <a:solidFill>
-                          <a:srgbClr val="1A1A1A"/>
-                        </a:solidFill>
-                        <a:effectLst/>
-                        <a:uLnTx/>
-                        <a:uFillTx/>
-                        <a:latin typeface="Segoe UI"/>
-                        <a:ea typeface="+mn-ea"/>
-                        <a:cs typeface="+mn-cs"/>
-                      </a:endParaRPr>
-                    </a:p>
-                  </a:txBody>
-                  <a:tcPr/>
-                </a:tc>
-                <a:tc>
-                  <a:txBody>
-                    <a:bodyPr/>
-                    <a:lstStyle/>
-                    <a:p>
-                      <a:pPr algn="ctr"/>
-                      <a:r>
-                        <a:rPr lang="en-GB" dirty="0"/>
-                        <a:t>01:30</a:t>
-                      </a:r>
-                    </a:p>
-                  </a:txBody>
-                  <a:tcPr/>
-                </a:tc>
-                <a:tc>
-                  <a:txBody>
-                    <a:bodyPr/>
-                    <a:lstStyle/>
-                    <a:p>
-                      <a:pPr algn="ctr"/>
-                      <a:r>
-                        <a:rPr lang="en-GB" dirty="0"/>
-                        <a:t>2</a:t>
-                      </a:r>
-                    </a:p>
-                  </a:txBody>
-                  <a:tcPr/>
-                </a:tc>
-                <a:tc>
-                  <a:txBody>
-                    <a:bodyPr/>
-                    <a:lstStyle/>
-                    <a:p>
-                      <a:pPr marL="0" marR="0" lvl="0" indent="0" algn="ctr" defTabSz="932742" rtl="0" eaLnBrk="1" fontAlgn="auto" latinLnBrk="0" hangingPunct="1">
-                        <a:lnSpc>
-                          <a:spcPct val="100000"/>
-                        </a:lnSpc>
-                        <a:spcBef>
-                          <a:spcPts val="0"/>
-                        </a:spcBef>
-                        <a:spcAft>
-                          <a:spcPts val="0"/>
-                        </a:spcAft>
-                        <a:buClrTx/>
-                        <a:buSzTx/>
-                        <a:buFontTx/>
-                        <a:buNone/>
-                        <a:tabLst/>
-                        <a:defRPr/>
-                      </a:pPr>
-                      <a:r>
-                        <a:rPr kumimoji="0" lang="en-GB" sz="1800" b="0" i="0" u="none" strike="noStrike" kern="1200" cap="none" spc="0" normalizeH="0" baseline="0" noProof="0" dirty="0">
-                          <a:ln>
-                            <a:noFill/>
-                          </a:ln>
-                          <a:solidFill>
-                            <a:srgbClr val="1A1A1A"/>
-                          </a:solidFill>
-                          <a:effectLst/>
-                          <a:uLnTx/>
-                          <a:uFillTx/>
-                          <a:latin typeface="Segoe UI"/>
-                          <a:ea typeface="+mn-ea"/>
-                          <a:cs typeface="+mn-cs"/>
-                        </a:rPr>
-                        <a:t>No, clock change</a:t>
-                      </a:r>
-                    </a:p>
-                  </a:txBody>
-                  <a:tcPr>
-                    <a:solidFill>
-                      <a:schemeClr val="accent4">
-                        <a:lumMod val="40000"/>
-                        <a:lumOff val="60000"/>
-                      </a:schemeClr>
-                    </a:solidFill>
-                  </a:tcPr>
-                </a:tc>
-                <a:tc>
-                  <a:txBody>
-                    <a:bodyPr/>
-                    <a:lstStyle/>
-                    <a:p>
-                      <a:pPr marL="0" marR="0" lvl="0" indent="0" algn="ctr" defTabSz="932742" rtl="0" eaLnBrk="1" fontAlgn="auto" latinLnBrk="0" hangingPunct="1">
-                        <a:lnSpc>
-                          <a:spcPct val="100000"/>
-                        </a:lnSpc>
-                        <a:spcBef>
-                          <a:spcPts val="0"/>
-                        </a:spcBef>
-                        <a:spcAft>
-                          <a:spcPts val="0"/>
-                        </a:spcAft>
-                        <a:buClrTx/>
-                        <a:buSzTx/>
-                        <a:buFontTx/>
-                        <a:buNone/>
-                        <a:tabLst/>
-                        <a:defRPr/>
-                      </a:pPr>
-                      <a:r>
-                        <a:rPr kumimoji="0" lang="en-GB" sz="1800" b="0" i="0" u="none" strike="noStrike" kern="1200" cap="none" spc="0" normalizeH="0" baseline="0" noProof="0" dirty="0">
-                          <a:ln>
-                            <a:noFill/>
-                          </a:ln>
-                          <a:solidFill>
-                            <a:srgbClr val="1A1A1A"/>
-                          </a:solidFill>
-                          <a:effectLst/>
-                          <a:uLnTx/>
-                          <a:uFillTx/>
-                          <a:latin typeface="Segoe UI"/>
-                          <a:ea typeface="+mn-ea"/>
-                          <a:cs typeface="+mn-cs"/>
-                        </a:rPr>
-                        <a:t>No</a:t>
-                      </a:r>
-                    </a:p>
-                  </a:txBody>
-                  <a:tcPr>
-                    <a:solidFill>
-                      <a:schemeClr val="accent4">
-                        <a:lumMod val="40000"/>
-                        <a:lumOff val="60000"/>
-                      </a:schemeClr>
-                    </a:solidFill>
-                  </a:tcPr>
-                </a:tc>
-                <a:extLst>
-                  <a:ext uri="{0D108BD9-81ED-4DB2-BD59-A6C34878D82A}">
-                    <a16:rowId xmlns:a16="http://schemas.microsoft.com/office/drawing/2014/main" val="649638530"/>
-                  </a:ext>
-                </a:extLst>
-              </a:tr>
-              <a:tr h="370840">
-                <a:tc>
-                  <a:txBody>
-                    <a:bodyPr/>
-                    <a:lstStyle/>
-                    <a:p>
-                      <a:pPr marL="0" marR="0" lvl="0" indent="0" algn="ctr" defTabSz="932742" rtl="0" eaLnBrk="1" fontAlgn="auto" latinLnBrk="0" hangingPunct="1">
-                        <a:lnSpc>
-                          <a:spcPct val="100000"/>
-                        </a:lnSpc>
-                        <a:spcBef>
-                          <a:spcPts val="0"/>
-                        </a:spcBef>
-                        <a:spcAft>
-                          <a:spcPts val="0"/>
-                        </a:spcAft>
-                        <a:buClrTx/>
-                        <a:buSzTx/>
-                        <a:buFontTx/>
-                        <a:buNone/>
-                        <a:tabLst/>
-                        <a:defRPr/>
-                      </a:pPr>
-                      <a:r>
-                        <a:rPr kumimoji="0" lang="en-GB" sz="1800" b="0" i="0" u="none" strike="noStrike" kern="1200" cap="none" spc="0" normalizeH="0" baseline="0" noProof="0">
-                          <a:ln>
-                            <a:noFill/>
-                          </a:ln>
-                          <a:solidFill>
-                            <a:srgbClr val="1A1A1A"/>
-                          </a:solidFill>
-                          <a:effectLst/>
-                          <a:uLnTx/>
-                          <a:uFillTx/>
-                          <a:latin typeface="Segoe UI"/>
-                          <a:ea typeface="+mn-ea"/>
-                          <a:cs typeface="+mn-cs"/>
-                        </a:rPr>
-                        <a:t>27/03/2022</a:t>
-                      </a:r>
-                      <a:endParaRPr kumimoji="0" lang="en-GB" sz="1800" b="0" i="0" u="none" strike="noStrike" kern="1200" cap="none" spc="0" normalizeH="0" baseline="0" noProof="0" dirty="0">
-                        <a:ln>
-                          <a:noFill/>
-                        </a:ln>
-                        <a:solidFill>
-                          <a:srgbClr val="1A1A1A"/>
-                        </a:solidFill>
-                        <a:effectLst/>
-                        <a:uLnTx/>
-                        <a:uFillTx/>
-                        <a:latin typeface="Segoe UI"/>
-                        <a:ea typeface="+mn-ea"/>
-                        <a:cs typeface="+mn-cs"/>
-                      </a:endParaRPr>
-                    </a:p>
-                  </a:txBody>
-                  <a:tcPr/>
-                </a:tc>
-                <a:tc>
-                  <a:txBody>
-                    <a:bodyPr/>
-                    <a:lstStyle/>
-                    <a:p>
-                      <a:pPr algn="ctr"/>
-                      <a:r>
-                        <a:rPr lang="en-GB" dirty="0"/>
-                        <a:t>02:00</a:t>
-                      </a:r>
-                    </a:p>
-                  </a:txBody>
-                  <a:tcPr/>
-                </a:tc>
-                <a:tc>
-                  <a:txBody>
-                    <a:bodyPr/>
-                    <a:lstStyle/>
-                    <a:p>
-                      <a:pPr algn="ctr"/>
-                      <a:r>
-                        <a:rPr lang="en-GB" dirty="0"/>
-                        <a:t>6</a:t>
-                      </a:r>
-                    </a:p>
-                  </a:txBody>
-                  <a:tcPr/>
-                </a:tc>
-                <a:tc>
-                  <a:txBody>
-                    <a:bodyPr/>
-                    <a:lstStyle/>
-                    <a:p>
-                      <a:pPr marL="0" marR="0" lvl="0" indent="0" algn="ctr" defTabSz="932742" rtl="0" eaLnBrk="1" fontAlgn="auto" latinLnBrk="0" hangingPunct="1">
-                        <a:lnSpc>
-                          <a:spcPct val="100000"/>
-                        </a:lnSpc>
-                        <a:spcBef>
-                          <a:spcPts val="0"/>
-                        </a:spcBef>
-                        <a:spcAft>
-                          <a:spcPts val="0"/>
-                        </a:spcAft>
-                        <a:buClrTx/>
-                        <a:buSzTx/>
-                        <a:buFontTx/>
-                        <a:buNone/>
-                        <a:tabLst/>
-                        <a:defRPr/>
-                      </a:pPr>
-                      <a:r>
-                        <a:rPr kumimoji="0" lang="en-GB" sz="1800" b="0" i="0" u="none" strike="noStrike" kern="1200" cap="none" spc="0" normalizeH="0" baseline="0" noProof="0">
-                          <a:ln>
-                            <a:noFill/>
-                          </a:ln>
-                          <a:solidFill>
-                            <a:srgbClr val="1A1A1A"/>
-                          </a:solidFill>
-                          <a:effectLst/>
-                          <a:uLnTx/>
-                          <a:uFillTx/>
-                          <a:latin typeface="Segoe UI"/>
-                          <a:ea typeface="+mn-ea"/>
-                          <a:cs typeface="+mn-cs"/>
-                        </a:rPr>
-                        <a:t>Yes</a:t>
-                      </a:r>
-                      <a:endParaRPr kumimoji="0" lang="en-GB" sz="1800" b="0" i="0" u="none" strike="noStrike" kern="1200" cap="none" spc="0" normalizeH="0" baseline="0" noProof="0" dirty="0">
-                        <a:ln>
-                          <a:noFill/>
-                        </a:ln>
-                        <a:solidFill>
-                          <a:srgbClr val="1A1A1A"/>
-                        </a:solidFill>
-                        <a:effectLst/>
-                        <a:uLnTx/>
-                        <a:uFillTx/>
-                        <a:latin typeface="Segoe UI"/>
-                        <a:ea typeface="+mn-ea"/>
-                        <a:cs typeface="+mn-cs"/>
-                      </a:endParaRPr>
-                    </a:p>
-                  </a:txBody>
-                  <a:tcPr>
-                    <a:solidFill>
-                      <a:schemeClr val="accent3">
-                        <a:lumMod val="40000"/>
-                        <a:lumOff val="60000"/>
-                      </a:schemeClr>
-                    </a:solidFill>
-                  </a:tcPr>
-                </a:tc>
-                <a:tc>
-                  <a:txBody>
-                    <a:bodyPr/>
-                    <a:lstStyle/>
-                    <a:p>
-                      <a:pPr marL="0" marR="0" lvl="0" indent="0" algn="ctr" defTabSz="932742" rtl="0" eaLnBrk="1" fontAlgn="auto" latinLnBrk="0" hangingPunct="1">
-                        <a:lnSpc>
-                          <a:spcPct val="100000"/>
-                        </a:lnSpc>
-                        <a:spcBef>
-                          <a:spcPts val="0"/>
-                        </a:spcBef>
-                        <a:spcAft>
-                          <a:spcPts val="0"/>
-                        </a:spcAft>
-                        <a:buClrTx/>
-                        <a:buSzTx/>
-                        <a:buFontTx/>
-                        <a:buNone/>
-                        <a:tabLst/>
-                        <a:defRPr/>
-                      </a:pPr>
-                      <a:r>
-                        <a:rPr kumimoji="0" lang="en-GB" sz="1800" b="0" i="0" u="none" strike="noStrike" kern="1200" cap="none" spc="0" normalizeH="0" baseline="0" noProof="0">
-                          <a:ln>
-                            <a:noFill/>
-                          </a:ln>
-                          <a:solidFill>
-                            <a:srgbClr val="1A1A1A"/>
-                          </a:solidFill>
-                          <a:effectLst/>
-                          <a:uLnTx/>
-                          <a:uFillTx/>
-                          <a:latin typeface="Segoe UI"/>
-                          <a:ea typeface="+mn-ea"/>
-                          <a:cs typeface="+mn-cs"/>
-                        </a:rPr>
-                        <a:t>Yes</a:t>
-                      </a:r>
-                      <a:endParaRPr kumimoji="0" lang="en-GB" sz="1800" b="0" i="0" u="none" strike="noStrike" kern="1200" cap="none" spc="0" normalizeH="0" baseline="0" noProof="0" dirty="0">
-                        <a:ln>
-                          <a:noFill/>
-                        </a:ln>
-                        <a:solidFill>
-                          <a:srgbClr val="1A1A1A"/>
-                        </a:solidFill>
-                        <a:effectLst/>
-                        <a:uLnTx/>
-                        <a:uFillTx/>
-                        <a:latin typeface="Segoe UI"/>
-                        <a:ea typeface="+mn-ea"/>
-                        <a:cs typeface="+mn-cs"/>
-                      </a:endParaRPr>
-                    </a:p>
-                  </a:txBody>
-                  <a:tcPr>
-                    <a:solidFill>
-                      <a:schemeClr val="accent3">
-                        <a:lumMod val="40000"/>
-                        <a:lumOff val="60000"/>
-                      </a:schemeClr>
-                    </a:solidFill>
-                  </a:tcPr>
-                </a:tc>
-                <a:extLst>
-                  <a:ext uri="{0D108BD9-81ED-4DB2-BD59-A6C34878D82A}">
-                    <a16:rowId xmlns:a16="http://schemas.microsoft.com/office/drawing/2014/main" val="3513149770"/>
-                  </a:ext>
-                </a:extLst>
-              </a:tr>
-              <a:tr h="370840">
-                <a:tc>
-                  <a:txBody>
-                    <a:bodyPr/>
-                    <a:lstStyle/>
-                    <a:p>
-                      <a:pPr marL="0" marR="0" lvl="0" indent="0" algn="ctr" defTabSz="932742" rtl="0" eaLnBrk="1" fontAlgn="auto" latinLnBrk="0" hangingPunct="1">
-                        <a:lnSpc>
-                          <a:spcPct val="100000"/>
-                        </a:lnSpc>
-                        <a:spcBef>
-                          <a:spcPts val="0"/>
-                        </a:spcBef>
-                        <a:spcAft>
-                          <a:spcPts val="0"/>
-                        </a:spcAft>
-                        <a:buClrTx/>
-                        <a:buSzTx/>
-                        <a:buFontTx/>
-                        <a:buNone/>
-                        <a:tabLst/>
-                        <a:defRPr/>
-                      </a:pPr>
-                      <a:r>
-                        <a:rPr kumimoji="0" lang="en-GB" sz="1800" b="0" i="0" u="none" strike="noStrike" kern="1200" cap="none" spc="0" normalizeH="0" baseline="0" noProof="0" dirty="0">
-                          <a:ln>
-                            <a:noFill/>
-                          </a:ln>
-                          <a:solidFill>
-                            <a:srgbClr val="1A1A1A"/>
-                          </a:solidFill>
-                          <a:effectLst/>
-                          <a:uLnTx/>
-                          <a:uFillTx/>
-                          <a:latin typeface="Segoe UI"/>
-                          <a:ea typeface="+mn-ea"/>
-                          <a:cs typeface="+mn-cs"/>
-                        </a:rPr>
-                        <a:t>27/03/2022</a:t>
-                      </a:r>
-                    </a:p>
-                  </a:txBody>
-                  <a:tcPr/>
-                </a:tc>
-                <a:tc>
-                  <a:txBody>
-                    <a:bodyPr/>
-                    <a:lstStyle/>
-                    <a:p>
-                      <a:pPr algn="ctr"/>
-                      <a:r>
-                        <a:rPr lang="en-GB" dirty="0"/>
-                        <a:t>02:01</a:t>
-                      </a:r>
-                    </a:p>
-                  </a:txBody>
-                  <a:tcPr/>
-                </a:tc>
-                <a:tc>
-                  <a:txBody>
-                    <a:bodyPr/>
-                    <a:lstStyle/>
-                    <a:p>
-                      <a:pPr algn="ctr"/>
-                      <a:r>
-                        <a:rPr lang="en-GB" dirty="0"/>
-                        <a:t>8</a:t>
-                      </a:r>
-                    </a:p>
-                  </a:txBody>
-                  <a:tcPr/>
-                </a:tc>
-                <a:tc>
-                  <a:txBody>
-                    <a:bodyPr/>
-                    <a:lstStyle/>
-                    <a:p>
-                      <a:pPr marL="0" marR="0" lvl="0" indent="0" algn="ctr" defTabSz="932742" rtl="0" eaLnBrk="1" fontAlgn="auto" latinLnBrk="0" hangingPunct="1">
-                        <a:lnSpc>
-                          <a:spcPct val="100000"/>
-                        </a:lnSpc>
-                        <a:spcBef>
-                          <a:spcPts val="0"/>
-                        </a:spcBef>
-                        <a:spcAft>
-                          <a:spcPts val="0"/>
-                        </a:spcAft>
-                        <a:buClrTx/>
-                        <a:buSzTx/>
-                        <a:buFontTx/>
-                        <a:buNone/>
-                        <a:tabLst/>
-                        <a:defRPr/>
-                      </a:pPr>
-                      <a:r>
-                        <a:rPr kumimoji="0" lang="en-GB" sz="1800" b="0" i="0" u="none" strike="noStrike" kern="1200" cap="none" spc="0" normalizeH="0" baseline="0" noProof="0" dirty="0">
-                          <a:ln>
-                            <a:noFill/>
-                          </a:ln>
-                          <a:solidFill>
-                            <a:srgbClr val="1A1A1A"/>
-                          </a:solidFill>
-                          <a:effectLst/>
-                          <a:uLnTx/>
-                          <a:uFillTx/>
-                          <a:latin typeface="Segoe UI"/>
-                          <a:ea typeface="+mn-ea"/>
-                          <a:cs typeface="+mn-cs"/>
-                        </a:rPr>
-                        <a:t>Yes</a:t>
-                      </a:r>
-                    </a:p>
-                  </a:txBody>
-                  <a:tcPr>
-                    <a:solidFill>
-                      <a:schemeClr val="accent3">
-                        <a:lumMod val="40000"/>
-                        <a:lumOff val="60000"/>
-                      </a:schemeClr>
-                    </a:solidFill>
-                  </a:tcPr>
-                </a:tc>
-                <a:tc>
-                  <a:txBody>
-                    <a:bodyPr/>
-                    <a:lstStyle/>
-                    <a:p>
-                      <a:pPr marL="0" marR="0" lvl="0" indent="0" algn="ctr" defTabSz="932742" rtl="0" eaLnBrk="1" fontAlgn="auto" latinLnBrk="0" hangingPunct="1">
-                        <a:lnSpc>
-                          <a:spcPct val="100000"/>
-                        </a:lnSpc>
-                        <a:spcBef>
-                          <a:spcPts val="0"/>
-                        </a:spcBef>
-                        <a:spcAft>
-                          <a:spcPts val="0"/>
-                        </a:spcAft>
-                        <a:buClrTx/>
-                        <a:buSzTx/>
-                        <a:buFontTx/>
-                        <a:buNone/>
-                        <a:tabLst/>
-                        <a:defRPr/>
-                      </a:pPr>
-                      <a:r>
-                        <a:rPr kumimoji="0" lang="en-GB" sz="1800" b="0" i="0" u="none" strike="noStrike" kern="1200" cap="none" spc="0" normalizeH="0" baseline="0" noProof="0" dirty="0">
-                          <a:ln>
-                            <a:noFill/>
-                          </a:ln>
-                          <a:solidFill>
-                            <a:srgbClr val="1A1A1A"/>
-                          </a:solidFill>
-                          <a:effectLst/>
-                          <a:uLnTx/>
-                          <a:uFillTx/>
-                          <a:latin typeface="Segoe UI"/>
-                          <a:ea typeface="+mn-ea"/>
-                          <a:cs typeface="+mn-cs"/>
-                        </a:rPr>
-                        <a:t>Yes</a:t>
-                      </a:r>
-                    </a:p>
-                  </a:txBody>
-                  <a:tcPr>
-                    <a:solidFill>
-                      <a:schemeClr val="accent3">
-                        <a:lumMod val="40000"/>
-                        <a:lumOff val="60000"/>
-                      </a:schemeClr>
-                    </a:solidFill>
-                  </a:tcPr>
-                </a:tc>
-                <a:extLst>
-                  <a:ext uri="{0D108BD9-81ED-4DB2-BD59-A6C34878D82A}">
-                    <a16:rowId xmlns:a16="http://schemas.microsoft.com/office/drawing/2014/main" val="527143241"/>
-                  </a:ext>
-                </a:extLst>
-              </a:tr>
-            </a:tbl>
-          </a:graphicData>
-        </a:graphic>
-      </p:graphicFrame>
-    </p:spTree>
-    <p:extLst>
-      <p:ext uri="{BB962C8B-B14F-4D97-AF65-F5344CB8AC3E}">
-        <p14:creationId xmlns:p14="http://schemas.microsoft.com/office/powerpoint/2010/main" val="3710908881"/>
       </p:ext>
     </p:extLst>
   </p:cSld>
@@ -30852,18 +31264,18 @@
 </file>
 
 <file path=customXml/item1.xml><?xml version="1.0" encoding="utf-8"?>
+<p:properties xmlns:p="http://schemas.microsoft.com/office/2006/metadata/properties" xmlns:xsi="http://www.w3.org/2001/XMLSchema-instance" xmlns:pc="http://schemas.microsoft.com/office/infopath/2007/PartnerControls">
+  <documentManagement/>
+</p:properties>
+</file>
+
+<file path=customXml/item2.xml><?xml version="1.0" encoding="utf-8"?>
 <?mso-contentType ?>
 <FormTemplates xmlns="http://schemas.microsoft.com/sharepoint/v3/contenttype/forms">
   <Display>DocumentLibraryForm</Display>
   <Edit>DocumentLibraryForm</Edit>
   <New>DocumentLibraryForm</New>
 </FormTemplates>
-</file>
-
-<file path=customXml/item2.xml><?xml version="1.0" encoding="utf-8"?>
-<p:properties xmlns:p="http://schemas.microsoft.com/office/2006/metadata/properties" xmlns:xsi="http://www.w3.org/2001/XMLSchema-instance" xmlns:pc="http://schemas.microsoft.com/office/infopath/2007/PartnerControls">
-  <documentManagement/>
-</p:properties>
 </file>
 
 <file path=customXml/item3.xml><?xml version="1.0" encoding="utf-8"?>
@@ -31021,14 +31433,6 @@
 </file>
 
 <file path=customXml/itemProps1.xml><?xml version="1.0" encoding="utf-8"?>
-<ds:datastoreItem xmlns:ds="http://schemas.openxmlformats.org/officeDocument/2006/customXml" ds:itemID="{758FDAC0-319D-4A54-8D8E-1D42CB1F8004}">
-  <ds:schemaRefs>
-    <ds:schemaRef ds:uri="http://schemas.microsoft.com/sharepoint/v3/contenttype/forms"/>
-  </ds:schemaRefs>
-</ds:datastoreItem>
-</file>
-
-<file path=customXml/itemProps2.xml><?xml version="1.0" encoding="utf-8"?>
 <ds:datastoreItem xmlns:ds="http://schemas.openxmlformats.org/officeDocument/2006/customXml" ds:itemID="{F990F116-B58F-4255-B05B-DA3808E0E5C6}">
   <ds:schemaRefs>
     <ds:schemaRef ds:uri="http://purl.org/dc/terms/"/>
@@ -31040,6 +31444,14 @@
     <ds:schemaRef ds:uri="http://schemas.microsoft.com/office/2006/metadata/properties"/>
     <ds:schemaRef ds:uri="http://www.w3.org/XML/1998/namespace"/>
     <ds:schemaRef ds:uri="http://purl.org/dc/dcmitype/"/>
+  </ds:schemaRefs>
+</ds:datastoreItem>
+</file>
+
+<file path=customXml/itemProps2.xml><?xml version="1.0" encoding="utf-8"?>
+<ds:datastoreItem xmlns:ds="http://schemas.openxmlformats.org/officeDocument/2006/customXml" ds:itemID="{758FDAC0-319D-4A54-8D8E-1D42CB1F8004}">
+  <ds:schemaRefs>
+    <ds:schemaRef ds:uri="http://schemas.microsoft.com/sharepoint/v3/contenttype/forms"/>
   </ds:schemaRefs>
 </ds:datastoreItem>
 </file>

</xml_diff>